<commit_message>
improved entry for traffic generator
</commit_message>
<xml_diff>
--- a/slides/TFM.pptx
+++ b/slides/TFM.pptx
@@ -9,6 +9,9 @@
   <p:notesMasterIdLst>
     <p:notesMasterId r:id="rId15"/>
   </p:notesMasterIdLst>
+  <p:handoutMasterIdLst>
+    <p:handoutMasterId r:id="rId16"/>
+  </p:handoutMasterIdLst>
   <p:sldIdLst>
     <p:sldId id="256" r:id="rId4"/>
     <p:sldId id="266" r:id="rId5"/>
@@ -3845,7 +3848,7 @@
   <dgm:whole/>
   <dgm:extLst>
     <a:ext uri="http://schemas.microsoft.com/office/drawing/2008/diagram">
-      <dsp:dataModelExt xmlns:dsp="http://schemas.microsoft.com/office/drawing/2008/diagram" relId="rId6" minVer="http://schemas.openxmlformats.org/drawingml/2006/diagram"/>
+      <dsp:dataModelExt xmlns:dsp="http://schemas.microsoft.com/office/drawing/2008/diagram" relId="rId7" minVer="http://schemas.openxmlformats.org/drawingml/2006/diagram"/>
     </a:ext>
   </dgm:extLst>
 </dgm:dataModel>
@@ -4842,8 +4845,8 @@
       </dsp:nvSpPr>
       <dsp:spPr>
         <a:xfrm>
-          <a:off x="1026891" y="1481385"/>
-          <a:ext cx="6074216" cy="933104"/>
+          <a:off x="1026891" y="1174143"/>
+          <a:ext cx="6074216" cy="1547588"/>
         </a:xfrm>
         <a:prstGeom prst="roundRect">
           <a:avLst/>
@@ -4880,12 +4883,12 @@
         </a:fontRef>
       </dsp:style>
       <dsp:txBody>
-        <a:bodyPr spcFirstLastPara="0" vert="horz" wrap="square" lIns="148590" tIns="148590" rIns="148590" bIns="148590" numCol="1" spcCol="1270" anchor="ctr" anchorCtr="0">
+        <a:bodyPr spcFirstLastPara="0" vert="horz" wrap="square" lIns="163830" tIns="163830" rIns="163830" bIns="163830" numCol="1" spcCol="1270" anchor="ctr" anchorCtr="0">
           <a:noAutofit/>
         </a:bodyPr>
         <a:lstStyle/>
         <a:p>
-          <a:pPr marL="0" lvl="0" indent="0" algn="ctr" defTabSz="1733550">
+          <a:pPr marL="0" lvl="0" indent="0" algn="ctr" defTabSz="1911350">
             <a:lnSpc>
               <a:spcPct val="90000"/>
             </a:lnSpc>
@@ -4898,7 +4901,7 @@
             <a:buNone/>
           </a:pPr>
           <a:r>
-            <a:rPr lang="es-ES" sz="3900" b="1" kern="1200" dirty="0">
+            <a:rPr lang="es-ES" sz="4300" b="1" kern="1200" dirty="0">
               <a:latin typeface="UTM Ericsson Capital" panose="02040603050506020204" pitchFamily="18" charset="0"/>
             </a:rPr>
             <a:t>EJECUCIÓN DE LA DEMO</a:t>
@@ -4906,8 +4909,8 @@
         </a:p>
       </dsp:txBody>
       <dsp:txXfrm>
-        <a:off x="1072441" y="1526935"/>
-        <a:ext cx="5983116" cy="842004"/>
+        <a:off x="1102438" y="1249690"/>
+        <a:ext cx="5923122" cy="1396494"/>
       </dsp:txXfrm>
     </dsp:sp>
   </dsp:spTree>
@@ -9855,8 +9858,8 @@
 </dgm:styleDef>
 </file>
 
-<file path=ppt/notesMasters/notesMaster1.xml><?xml version="1.0" encoding="utf-8"?>
-<p:notesMaster xmlns:a="http://schemas.openxmlformats.org/drawingml/2006/main" xmlns:r="http://schemas.openxmlformats.org/officeDocument/2006/relationships" xmlns:p="http://schemas.openxmlformats.org/presentationml/2006/main">
+<file path=ppt/handoutMasters/handoutMaster1.xml><?xml version="1.0" encoding="utf-8"?>
+<p:handoutMaster xmlns:a="http://schemas.openxmlformats.org/drawingml/2006/main" xmlns:r="http://schemas.openxmlformats.org/officeDocument/2006/relationships" xmlns:p="http://schemas.openxmlformats.org/presentationml/2006/main">
   <p:cSld>
     <p:bg>
       <p:bgRef idx="1001">
@@ -9879,7 +9882,13 @@
       </p:grpSpPr>
       <p:sp>
         <p:nvSpPr>
-          <p:cNvPr id="2" name="Marcador de encabezado 1"/>
+          <p:cNvPr id="2" name="Marcador de encabezado 1">
+            <a:extLst>
+              <a:ext uri="{FF2B5EF4-FFF2-40B4-BE49-F238E27FC236}">
+                <a16:creationId xmlns:a16="http://schemas.microsoft.com/office/drawing/2014/main" id="{E1F088C0-3E05-451F-A935-0B247C7523DB}"/>
+              </a:ext>
+            </a:extLst>
+          </p:cNvPr>
           <p:cNvSpPr>
             <a:spLocks noGrp="1"/>
           </p:cNvSpPr>
@@ -9908,6 +9917,158 @@
           </a:p>
         </p:txBody>
       </p:sp>
+      <p:sp>
+        <p:nvSpPr>
+          <p:cNvPr id="3" name="Marcador de fecha 2">
+            <a:extLst>
+              <a:ext uri="{FF2B5EF4-FFF2-40B4-BE49-F238E27FC236}">
+                <a16:creationId xmlns:a16="http://schemas.microsoft.com/office/drawing/2014/main" id="{4CAD4E39-456E-4CF7-AC75-E72808107BAE}"/>
+              </a:ext>
+            </a:extLst>
+          </p:cNvPr>
+          <p:cNvSpPr>
+            <a:spLocks noGrp="1"/>
+          </p:cNvSpPr>
+          <p:nvPr>
+            <p:ph type="dt" sz="quarter" idx="1"/>
+          </p:nvPr>
+        </p:nvSpPr>
+        <p:spPr>
+          <a:xfrm>
+            <a:off x="3884613" y="0"/>
+            <a:ext cx="2971800" cy="458788"/>
+          </a:xfrm>
+          <a:prstGeom prst="rect">
+            <a:avLst/>
+          </a:prstGeom>
+        </p:spPr>
+        <p:txBody>
+          <a:bodyPr vert="horz" lIns="91440" tIns="45720" rIns="91440" bIns="45720" rtlCol="0"/>
+          <a:lstStyle>
+            <a:lvl1pPr algn="r">
+              <a:defRPr sz="1200"/>
+            </a:lvl1pPr>
+          </a:lstStyle>
+          <a:p>
+            <a:fld id="{DB483378-E415-4A05-8705-6F229D0DB1C9}" type="datetimeFigureOut">
+              <a:rPr lang="es-ES" smtClean="0"/>
+              <a:t>13/09/2017</a:t>
+            </a:fld>
+            <a:endParaRPr lang="es-ES"/>
+          </a:p>
+        </p:txBody>
+      </p:sp>
+      <p:sp>
+        <p:nvSpPr>
+          <p:cNvPr id="4" name="Marcador de pie de página 3">
+            <a:extLst>
+              <a:ext uri="{FF2B5EF4-FFF2-40B4-BE49-F238E27FC236}">
+                <a16:creationId xmlns:a16="http://schemas.microsoft.com/office/drawing/2014/main" id="{594EB906-6195-43DC-BA0F-C28A8A66E64E}"/>
+              </a:ext>
+            </a:extLst>
+          </p:cNvPr>
+          <p:cNvSpPr>
+            <a:spLocks noGrp="1"/>
+          </p:cNvSpPr>
+          <p:nvPr>
+            <p:ph type="ftr" sz="quarter" idx="2"/>
+          </p:nvPr>
+        </p:nvSpPr>
+        <p:spPr>
+          <a:xfrm>
+            <a:off x="0" y="8685213"/>
+            <a:ext cx="2971800" cy="458787"/>
+          </a:xfrm>
+          <a:prstGeom prst="rect">
+            <a:avLst/>
+          </a:prstGeom>
+        </p:spPr>
+        <p:txBody>
+          <a:bodyPr vert="horz" lIns="91440" tIns="45720" rIns="91440" bIns="45720" rtlCol="0" anchor="b"/>
+          <a:lstStyle>
+            <a:lvl1pPr algn="l">
+              <a:defRPr sz="1200"/>
+            </a:lvl1pPr>
+          </a:lstStyle>
+          <a:p>
+            <a:endParaRPr lang="es-ES"/>
+          </a:p>
+        </p:txBody>
+      </p:sp>
+      <p:sp>
+        <p:nvSpPr>
+          <p:cNvPr id="5" name="Marcador de número de diapositiva 4">
+            <a:extLst>
+              <a:ext uri="{FF2B5EF4-FFF2-40B4-BE49-F238E27FC236}">
+                <a16:creationId xmlns:a16="http://schemas.microsoft.com/office/drawing/2014/main" id="{19D7A466-663C-4562-AC44-2F1D6452AF48}"/>
+              </a:ext>
+            </a:extLst>
+          </p:cNvPr>
+          <p:cNvSpPr>
+            <a:spLocks noGrp="1"/>
+          </p:cNvSpPr>
+          <p:nvPr>
+            <p:ph type="sldNum" sz="quarter" idx="3"/>
+          </p:nvPr>
+        </p:nvSpPr>
+        <p:spPr>
+          <a:xfrm>
+            <a:off x="3884613" y="8685213"/>
+            <a:ext cx="2971800" cy="458787"/>
+          </a:xfrm>
+          <a:prstGeom prst="rect">
+            <a:avLst/>
+          </a:prstGeom>
+        </p:spPr>
+        <p:txBody>
+          <a:bodyPr vert="horz" lIns="91440" tIns="45720" rIns="91440" bIns="45720" rtlCol="0" anchor="b"/>
+          <a:lstStyle>
+            <a:lvl1pPr algn="r">
+              <a:defRPr sz="1200"/>
+            </a:lvl1pPr>
+          </a:lstStyle>
+          <a:p>
+            <a:fld id="{48AA3D92-A1D7-492C-A769-E7469F569337}" type="slidenum">
+              <a:rPr lang="es-ES" smtClean="0"/>
+              <a:t>‹Nº›</a:t>
+            </a:fld>
+            <a:endParaRPr lang="es-ES"/>
+          </a:p>
+        </p:txBody>
+      </p:sp>
+    </p:spTree>
+    <p:extLst>
+      <p:ext uri="{BB962C8B-B14F-4D97-AF65-F5344CB8AC3E}">
+        <p14:creationId xmlns:p14="http://schemas.microsoft.com/office/powerpoint/2010/main" val="2550237251"/>
+      </p:ext>
+    </p:extLst>
+  </p:cSld>
+  <p:clrMap bg1="lt1" tx1="dk1" bg2="lt2" tx2="dk2" accent1="accent1" accent2="accent2" accent3="accent3" accent4="accent4" accent5="accent5" accent6="accent6" hlink="hlink" folHlink="folHlink"/>
+</p:handoutMaster>
+</file>
+
+<file path=ppt/notesMasters/notesMaster1.xml><?xml version="1.0" encoding="utf-8"?>
+<p:notesMaster xmlns:a="http://schemas.openxmlformats.org/drawingml/2006/main" xmlns:r="http://schemas.openxmlformats.org/officeDocument/2006/relationships" xmlns:p="http://schemas.openxmlformats.org/presentationml/2006/main">
+  <p:cSld>
+    <p:bg>
+      <p:bgRef idx="1001">
+        <a:schemeClr val="bg1"/>
+      </p:bgRef>
+    </p:bg>
+    <p:spTree>
+      <p:nvGrpSpPr>
+        <p:cNvPr id="1" name=""/>
+        <p:cNvGrpSpPr/>
+        <p:nvPr/>
+      </p:nvGrpSpPr>
+      <p:grpSpPr>
+        <a:xfrm>
+          <a:off x="0" y="0"/>
+          <a:ext cx="0" cy="0"/>
+          <a:chOff x="0" y="0"/>
+          <a:chExt cx="0" cy="0"/>
+        </a:xfrm>
+      </p:grpSpPr>
       <p:sp>
         <p:nvSpPr>
           <p:cNvPr id="3" name="Marcador de fecha 2"/>
@@ -9937,7 +10098,7 @@
           <a:p>
             <a:fld id="{9B26D589-5E3F-47E8-97BD-BBFA6DDCE7C9}" type="datetimeFigureOut">
               <a:rPr lang="es-ES" smtClean="0"/>
-              <a:t>01/09/2017</a:t>
+              <a:t>13/09/2017</a:t>
             </a:fld>
             <a:endParaRPr lang="es-ES"/>
           </a:p>
@@ -10097,6 +10258,43 @@
               <a:rPr lang="es-ES" smtClean="0"/>
               <a:t>‹Nº›</a:t>
             </a:fld>
+            <a:endParaRPr lang="es-ES"/>
+          </a:p>
+        </p:txBody>
+      </p:sp>
+      <p:sp>
+        <p:nvSpPr>
+          <p:cNvPr id="8" name="Marcador de encabezado 7">
+            <a:extLst>
+              <a:ext uri="{FF2B5EF4-FFF2-40B4-BE49-F238E27FC236}">
+                <a16:creationId xmlns:a16="http://schemas.microsoft.com/office/drawing/2014/main" id="{E80BB50A-5553-4B19-90A8-585FC22BB13F}"/>
+              </a:ext>
+            </a:extLst>
+          </p:cNvPr>
+          <p:cNvSpPr>
+            <a:spLocks noGrp="1"/>
+          </p:cNvSpPr>
+          <p:nvPr>
+            <p:ph type="hdr" sz="quarter"/>
+          </p:nvPr>
+        </p:nvSpPr>
+        <p:spPr>
+          <a:xfrm>
+            <a:off x="0" y="0"/>
+            <a:ext cx="2971800" cy="458788"/>
+          </a:xfrm>
+          <a:prstGeom prst="rect">
+            <a:avLst/>
+          </a:prstGeom>
+        </p:spPr>
+        <p:txBody>
+          <a:bodyPr vert="horz" lIns="91440" tIns="45720" rIns="91440" bIns="45720" rtlCol="0"/>
+          <a:lstStyle>
+            <a:lvl1pPr algn="l">
+              <a:defRPr sz="1200"/>
+            </a:lvl1pPr>
+          </a:lstStyle>
+          <a:p>
             <a:endParaRPr lang="es-ES"/>
           </a:p>
         </p:txBody>
@@ -10202,6 +10400,90 @@
     </a:lvl9pPr>
   </p:notesStyle>
 </p:notesMaster>
+</file>
+
+<file path=ppt/notesSlides/notesSlide1.xml><?xml version="1.0" encoding="utf-8"?>
+<p:notes xmlns:a="http://schemas.openxmlformats.org/drawingml/2006/main" xmlns:r="http://schemas.openxmlformats.org/officeDocument/2006/relationships" xmlns:p="http://schemas.openxmlformats.org/presentationml/2006/main">
+  <p:cSld>
+    <p:spTree>
+      <p:nvGrpSpPr>
+        <p:cNvPr id="1" name=""/>
+        <p:cNvGrpSpPr/>
+        <p:nvPr/>
+      </p:nvGrpSpPr>
+      <p:grpSpPr>
+        <a:xfrm>
+          <a:off x="0" y="0"/>
+          <a:ext cx="0" cy="0"/>
+          <a:chOff x="0" y="0"/>
+          <a:chExt cx="0" cy="0"/>
+        </a:xfrm>
+      </p:grpSpPr>
+      <p:sp>
+        <p:nvSpPr>
+          <p:cNvPr id="2" name="Marcador de imagen de diapositiva 1"/>
+          <p:cNvSpPr>
+            <a:spLocks noGrp="1" noRot="1" noChangeAspect="1"/>
+          </p:cNvSpPr>
+          <p:nvPr>
+            <p:ph type="sldImg"/>
+          </p:nvPr>
+        </p:nvSpPr>
+        <p:spPr/>
+      </p:sp>
+      <p:sp>
+        <p:nvSpPr>
+          <p:cNvPr id="3" name="Marcador de notas 2"/>
+          <p:cNvSpPr>
+            <a:spLocks noGrp="1"/>
+          </p:cNvSpPr>
+          <p:nvPr>
+            <p:ph type="body" idx="1"/>
+          </p:nvPr>
+        </p:nvSpPr>
+        <p:spPr/>
+        <p:txBody>
+          <a:bodyPr/>
+          <a:lstStyle/>
+          <a:p>
+            <a:endParaRPr lang="es-ES"/>
+          </a:p>
+        </p:txBody>
+      </p:sp>
+      <p:sp>
+        <p:nvSpPr>
+          <p:cNvPr id="4" name="Marcador de número de diapositiva 3"/>
+          <p:cNvSpPr>
+            <a:spLocks noGrp="1"/>
+          </p:cNvSpPr>
+          <p:nvPr>
+            <p:ph type="sldNum" sz="quarter" idx="10"/>
+          </p:nvPr>
+        </p:nvSpPr>
+        <p:spPr/>
+        <p:txBody>
+          <a:bodyPr/>
+          <a:lstStyle/>
+          <a:p>
+            <a:fld id="{0A39E505-5E6B-4B15-B11C-28AB1E673129}" type="slidenum">
+              <a:rPr lang="es-ES" smtClean="0"/>
+              <a:t>11</a:t>
+            </a:fld>
+            <a:endParaRPr lang="es-ES"/>
+          </a:p>
+        </p:txBody>
+      </p:sp>
+    </p:spTree>
+    <p:extLst>
+      <p:ext uri="{BB962C8B-B14F-4D97-AF65-F5344CB8AC3E}">
+        <p14:creationId xmlns:p14="http://schemas.microsoft.com/office/powerpoint/2010/main" val="2902239135"/>
+      </p:ext>
+    </p:extLst>
+  </p:cSld>
+  <p:clrMapOvr>
+    <a:masterClrMapping/>
+  </p:clrMapOvr>
+</p:notes>
 </file>
 
 <file path=ppt/slideLayouts/slideLayout1.xml><?xml version="1.0" encoding="utf-8"?>
@@ -14876,32 +15158,6 @@
       </p:sp>
       <p:pic>
         <p:nvPicPr>
-          <p:cNvPr id="7" name="Logo2011" descr="ERI_UF_rgb"/>
-          <p:cNvPicPr>
-            <a:picLocks noChangeAspect="1" noChangeArrowheads="1"/>
-          </p:cNvPicPr>
-          <p:nvPr userDrawn="1"/>
-        </p:nvPicPr>
-        <p:blipFill>
-          <a:blip r:embed="rId14" cstate="print"/>
-          <a:srcRect/>
-          <a:stretch>
-            <a:fillRect/>
-          </a:stretch>
-        </p:blipFill>
-        <p:spPr bwMode="auto">
-          <a:xfrm>
-            <a:off x="10126800" y="577849"/>
-            <a:ext cx="1027112" cy="900113"/>
-          </a:xfrm>
-          <a:prstGeom prst="rect">
-            <a:avLst/>
-          </a:prstGeom>
-          <a:noFill/>
-        </p:spPr>
-      </p:pic>
-      <p:pic>
-        <p:nvPicPr>
           <p:cNvPr id="8" name="Imagen 7"/>
           <p:cNvPicPr>
             <a:picLocks noChangeAspect="1"/>
@@ -14909,7 +15165,7 @@
           <p:nvPr userDrawn="1"/>
         </p:nvPicPr>
         <p:blipFill>
-          <a:blip r:embed="rId15">
+          <a:blip r:embed="rId14">
             <a:extLst>
               <a:ext uri="{28A0092B-C50C-407E-A947-70E740481C1C}">
                 <a14:useLocalDpi xmlns:a14="http://schemas.microsoft.com/office/drawing/2010/main" val="0"/>
@@ -15504,32 +15760,6 @@
           <a:prstGeom prst="rect">
             <a:avLst/>
           </a:prstGeom>
-        </p:spPr>
-      </p:pic>
-      <p:pic>
-        <p:nvPicPr>
-          <p:cNvPr id="8" name="Econ2011" descr="ECON_RGB"/>
-          <p:cNvPicPr>
-            <a:picLocks noChangeAspect="1" noChangeArrowheads="1"/>
-          </p:cNvPicPr>
-          <p:nvPr userDrawn="1"/>
-        </p:nvPicPr>
-        <p:blipFill>
-          <a:blip r:embed="rId13" cstate="print"/>
-          <a:srcRect/>
-          <a:stretch>
-            <a:fillRect/>
-          </a:stretch>
-        </p:blipFill>
-        <p:spPr bwMode="auto">
-          <a:xfrm>
-            <a:off x="10842151" y="579600"/>
-            <a:ext cx="511649" cy="677935"/>
-          </a:xfrm>
-          <a:prstGeom prst="rect">
-            <a:avLst/>
-          </a:prstGeom>
-          <a:noFill/>
         </p:spPr>
       </p:pic>
     </p:spTree>
@@ -16353,7 +16583,7 @@
           <a:p>
             <a:r>
               <a:rPr lang="es-ES" dirty="0"/>
-              <a:t>15/09/2017</a:t>
+              <a:t>14/09/2017</a:t>
             </a:r>
           </a:p>
         </p:txBody>
@@ -16459,39 +16689,6 @@
       </p:sp>
       <p:sp>
         <p:nvSpPr>
-          <p:cNvPr id="23" name="Marcador de fecha 3">
-            <a:extLst>
-              <a:ext uri="{FF2B5EF4-FFF2-40B4-BE49-F238E27FC236}">
-                <a16:creationId xmlns:a16="http://schemas.microsoft.com/office/drawing/2014/main" id="{E51FF9E2-0149-4619-9464-B6460754077F}"/>
-              </a:ext>
-            </a:extLst>
-          </p:cNvPr>
-          <p:cNvSpPr>
-            <a:spLocks noGrp="1"/>
-          </p:cNvSpPr>
-          <p:nvPr>
-            <p:ph type="dt" sz="half" idx="10"/>
-          </p:nvPr>
-        </p:nvSpPr>
-        <p:spPr>
-          <a:xfrm>
-            <a:off x="838200" y="6356350"/>
-            <a:ext cx="2743200" cy="365125"/>
-          </a:xfrm>
-        </p:spPr>
-        <p:txBody>
-          <a:bodyPr/>
-          <a:lstStyle/>
-          <a:p>
-            <a:r>
-              <a:rPr lang="es-ES" dirty="0"/>
-              <a:t>15/09/2017</a:t>
-            </a:r>
-          </a:p>
-        </p:txBody>
-      </p:sp>
-      <p:sp>
-        <p:nvSpPr>
           <p:cNvPr id="32" name="Marcador de pie de página 4">
             <a:extLst>
               <a:ext uri="{FF2B5EF4-FFF2-40B4-BE49-F238E27FC236}">
@@ -16631,6 +16828,39 @@
           </a:prstGeom>
         </p:spPr>
       </p:pic>
+      <p:sp>
+        <p:nvSpPr>
+          <p:cNvPr id="8" name="Marcador de fecha 3">
+            <a:extLst>
+              <a:ext uri="{FF2B5EF4-FFF2-40B4-BE49-F238E27FC236}">
+                <a16:creationId xmlns:a16="http://schemas.microsoft.com/office/drawing/2014/main" id="{D137F5F6-790C-46C5-92A1-AB2ECA82734A}"/>
+              </a:ext>
+            </a:extLst>
+          </p:cNvPr>
+          <p:cNvSpPr>
+            <a:spLocks noGrp="1"/>
+          </p:cNvSpPr>
+          <p:nvPr>
+            <p:ph type="dt" sz="half" idx="10"/>
+          </p:nvPr>
+        </p:nvSpPr>
+        <p:spPr>
+          <a:xfrm>
+            <a:off x="838200" y="6356350"/>
+            <a:ext cx="2743200" cy="365125"/>
+          </a:xfrm>
+        </p:spPr>
+        <p:txBody>
+          <a:bodyPr/>
+          <a:lstStyle/>
+          <a:p>
+            <a:r>
+              <a:rPr lang="es-ES" dirty="0"/>
+              <a:t>14/09/2017</a:t>
+            </a:r>
+          </a:p>
+        </p:txBody>
+      </p:sp>
     </p:spTree>
     <p:extLst>
       <p:ext uri="{BB962C8B-B14F-4D97-AF65-F5344CB8AC3E}">
@@ -16663,28 +16893,6 @@
       </p:grpSpPr>
       <p:sp>
         <p:nvSpPr>
-          <p:cNvPr id="4" name="Marcador de fecha 3"/>
-          <p:cNvSpPr>
-            <a:spLocks noGrp="1"/>
-          </p:cNvSpPr>
-          <p:nvPr>
-            <p:ph type="dt" sz="half" idx="10"/>
-          </p:nvPr>
-        </p:nvSpPr>
-        <p:spPr/>
-        <p:txBody>
-          <a:bodyPr/>
-          <a:lstStyle/>
-          <a:p>
-            <a:r>
-              <a:rPr lang="es-ES" dirty="0"/>
-              <a:t>15/09/2017</a:t>
-            </a:r>
-          </a:p>
-        </p:txBody>
-      </p:sp>
-      <p:sp>
-        <p:nvSpPr>
           <p:cNvPr id="5" name="Marcador de pie de página 4"/>
           <p:cNvSpPr>
             <a:spLocks noGrp="1"/>
@@ -16799,10 +17007,43 @@
         </p:xfrm>
         <a:graphic>
           <a:graphicData uri="http://schemas.openxmlformats.org/drawingml/2006/diagram">
-            <dgm:relIds xmlns:dgm="http://schemas.openxmlformats.org/drawingml/2006/diagram" xmlns:r="http://schemas.openxmlformats.org/officeDocument/2006/relationships" r:dm="rId2" r:lo="rId3" r:qs="rId4" r:cs="rId5"/>
+            <dgm:relIds xmlns:dgm="http://schemas.openxmlformats.org/drawingml/2006/diagram" xmlns:r="http://schemas.openxmlformats.org/officeDocument/2006/relationships" r:dm="rId3" r:lo="rId4" r:qs="rId5" r:cs="rId6"/>
           </a:graphicData>
         </a:graphic>
       </p:graphicFrame>
+      <p:sp>
+        <p:nvSpPr>
+          <p:cNvPr id="8" name="Marcador de fecha 3">
+            <a:extLst>
+              <a:ext uri="{FF2B5EF4-FFF2-40B4-BE49-F238E27FC236}">
+                <a16:creationId xmlns:a16="http://schemas.microsoft.com/office/drawing/2014/main" id="{908F43DC-6CB3-48FF-91E8-634971DBBE77}"/>
+              </a:ext>
+            </a:extLst>
+          </p:cNvPr>
+          <p:cNvSpPr>
+            <a:spLocks noGrp="1"/>
+          </p:cNvSpPr>
+          <p:nvPr>
+            <p:ph type="dt" sz="half" idx="10"/>
+          </p:nvPr>
+        </p:nvSpPr>
+        <p:spPr>
+          <a:xfrm>
+            <a:off x="838200" y="6356350"/>
+            <a:ext cx="2743200" cy="365125"/>
+          </a:xfrm>
+        </p:spPr>
+        <p:txBody>
+          <a:bodyPr/>
+          <a:lstStyle/>
+          <a:p>
+            <a:r>
+              <a:rPr lang="es-ES" dirty="0"/>
+              <a:t>14/09/2017</a:t>
+            </a:r>
+          </a:p>
+        </p:txBody>
+      </p:sp>
     </p:spTree>
     <p:extLst>
       <p:ext uri="{BB962C8B-B14F-4D97-AF65-F5344CB8AC3E}">
@@ -16850,7 +17091,7 @@
           <a:p>
             <a:r>
               <a:rPr lang="es-ES" dirty="0"/>
-              <a:t>15/09/2017</a:t>
+              <a:t>14/09/2017</a:t>
             </a:r>
           </a:p>
         </p:txBody>
@@ -17077,39 +17318,6 @@
               <a:t>3</a:t>
             </a:fld>
             <a:endParaRPr lang="es-ES"/>
-          </a:p>
-        </p:txBody>
-      </p:sp>
-      <p:sp>
-        <p:nvSpPr>
-          <p:cNvPr id="23" name="Marcador de fecha 3">
-            <a:extLst>
-              <a:ext uri="{FF2B5EF4-FFF2-40B4-BE49-F238E27FC236}">
-                <a16:creationId xmlns:a16="http://schemas.microsoft.com/office/drawing/2014/main" id="{E51FF9E2-0149-4619-9464-B6460754077F}"/>
-              </a:ext>
-            </a:extLst>
-          </p:cNvPr>
-          <p:cNvSpPr>
-            <a:spLocks noGrp="1"/>
-          </p:cNvSpPr>
-          <p:nvPr>
-            <p:ph type="dt" sz="half" idx="10"/>
-          </p:nvPr>
-        </p:nvSpPr>
-        <p:spPr>
-          <a:xfrm>
-            <a:off x="838200" y="6356350"/>
-            <a:ext cx="2743200" cy="365125"/>
-          </a:xfrm>
-        </p:spPr>
-        <p:txBody>
-          <a:bodyPr/>
-          <a:lstStyle/>
-          <a:p>
-            <a:r>
-              <a:rPr lang="es-ES" dirty="0"/>
-              <a:t>15/09/2017</a:t>
-            </a:r>
           </a:p>
         </p:txBody>
       </p:sp>
@@ -17325,6 +17533,39 @@
           </a:prstGeom>
         </p:spPr>
       </p:pic>
+      <p:sp>
+        <p:nvSpPr>
+          <p:cNvPr id="10" name="Marcador de fecha 3">
+            <a:extLst>
+              <a:ext uri="{FF2B5EF4-FFF2-40B4-BE49-F238E27FC236}">
+                <a16:creationId xmlns:a16="http://schemas.microsoft.com/office/drawing/2014/main" id="{D3CE607B-8215-4D6C-B45D-BB0B89BAD2E9}"/>
+              </a:ext>
+            </a:extLst>
+          </p:cNvPr>
+          <p:cNvSpPr>
+            <a:spLocks noGrp="1"/>
+          </p:cNvSpPr>
+          <p:nvPr>
+            <p:ph type="dt" sz="half" idx="10"/>
+          </p:nvPr>
+        </p:nvSpPr>
+        <p:spPr>
+          <a:xfrm>
+            <a:off x="838200" y="6356350"/>
+            <a:ext cx="2743200" cy="365125"/>
+          </a:xfrm>
+        </p:spPr>
+        <p:txBody>
+          <a:bodyPr/>
+          <a:lstStyle/>
+          <a:p>
+            <a:r>
+              <a:rPr lang="es-ES" dirty="0"/>
+              <a:t>14/09/2017</a:t>
+            </a:r>
+          </a:p>
+        </p:txBody>
+      </p:sp>
     </p:spTree>
     <p:extLst>
       <p:ext uri="{BB962C8B-B14F-4D97-AF65-F5344CB8AC3E}">
@@ -17421,39 +17662,6 @@
               <a:t>4</a:t>
             </a:fld>
             <a:endParaRPr lang="es-ES"/>
-          </a:p>
-        </p:txBody>
-      </p:sp>
-      <p:sp>
-        <p:nvSpPr>
-          <p:cNvPr id="23" name="Marcador de fecha 3">
-            <a:extLst>
-              <a:ext uri="{FF2B5EF4-FFF2-40B4-BE49-F238E27FC236}">
-                <a16:creationId xmlns:a16="http://schemas.microsoft.com/office/drawing/2014/main" id="{E51FF9E2-0149-4619-9464-B6460754077F}"/>
-              </a:ext>
-            </a:extLst>
-          </p:cNvPr>
-          <p:cNvSpPr>
-            <a:spLocks noGrp="1"/>
-          </p:cNvSpPr>
-          <p:nvPr>
-            <p:ph type="dt" sz="half" idx="10"/>
-          </p:nvPr>
-        </p:nvSpPr>
-        <p:spPr>
-          <a:xfrm>
-            <a:off x="838200" y="6356350"/>
-            <a:ext cx="2743200" cy="365125"/>
-          </a:xfrm>
-        </p:spPr>
-        <p:txBody>
-          <a:bodyPr/>
-          <a:lstStyle/>
-          <a:p>
-            <a:r>
-              <a:rPr lang="es-ES" dirty="0"/>
-              <a:t>15/09/2017</a:t>
-            </a:r>
           </a:p>
         </p:txBody>
       </p:sp>
@@ -18295,6 +18503,39 @@
           </a:graphicData>
         </a:graphic>
       </p:graphicFrame>
+      <p:sp>
+        <p:nvSpPr>
+          <p:cNvPr id="8" name="Marcador de fecha 3">
+            <a:extLst>
+              <a:ext uri="{FF2B5EF4-FFF2-40B4-BE49-F238E27FC236}">
+                <a16:creationId xmlns:a16="http://schemas.microsoft.com/office/drawing/2014/main" id="{EE2EC2B2-179A-42E9-8EDB-2644CBF6A367}"/>
+              </a:ext>
+            </a:extLst>
+          </p:cNvPr>
+          <p:cNvSpPr>
+            <a:spLocks noGrp="1"/>
+          </p:cNvSpPr>
+          <p:nvPr>
+            <p:ph type="dt" sz="half" idx="10"/>
+          </p:nvPr>
+        </p:nvSpPr>
+        <p:spPr>
+          <a:xfrm>
+            <a:off x="838200" y="6356350"/>
+            <a:ext cx="2743200" cy="365125"/>
+          </a:xfrm>
+        </p:spPr>
+        <p:txBody>
+          <a:bodyPr/>
+          <a:lstStyle/>
+          <a:p>
+            <a:r>
+              <a:rPr lang="es-ES" dirty="0"/>
+              <a:t>14/09/2017</a:t>
+            </a:r>
+          </a:p>
+        </p:txBody>
+      </p:sp>
     </p:spTree>
     <p:extLst>
       <p:ext uri="{BB962C8B-B14F-4D97-AF65-F5344CB8AC3E}">
@@ -18396,39 +18637,6 @@
       </p:sp>
       <p:sp>
         <p:nvSpPr>
-          <p:cNvPr id="23" name="Marcador de fecha 3">
-            <a:extLst>
-              <a:ext uri="{FF2B5EF4-FFF2-40B4-BE49-F238E27FC236}">
-                <a16:creationId xmlns:a16="http://schemas.microsoft.com/office/drawing/2014/main" id="{E51FF9E2-0149-4619-9464-B6460754077F}"/>
-              </a:ext>
-            </a:extLst>
-          </p:cNvPr>
-          <p:cNvSpPr>
-            <a:spLocks noGrp="1"/>
-          </p:cNvSpPr>
-          <p:nvPr>
-            <p:ph type="dt" sz="half" idx="10"/>
-          </p:nvPr>
-        </p:nvSpPr>
-        <p:spPr>
-          <a:xfrm>
-            <a:off x="838200" y="6356350"/>
-            <a:ext cx="2743200" cy="365125"/>
-          </a:xfrm>
-        </p:spPr>
-        <p:txBody>
-          <a:bodyPr/>
-          <a:lstStyle/>
-          <a:p>
-            <a:r>
-              <a:rPr lang="es-ES" dirty="0"/>
-              <a:t>15/09/2017</a:t>
-            </a:r>
-          </a:p>
-        </p:txBody>
-      </p:sp>
-      <p:sp>
-        <p:nvSpPr>
           <p:cNvPr id="32" name="Marcador de pie de página 4">
             <a:extLst>
               <a:ext uri="{FF2B5EF4-FFF2-40B4-BE49-F238E27FC236}">
@@ -18511,6 +18719,39 @@
           </a:prstGeom>
         </p:spPr>
       </p:pic>
+      <p:sp>
+        <p:nvSpPr>
+          <p:cNvPr id="7" name="Marcador de fecha 3">
+            <a:extLst>
+              <a:ext uri="{FF2B5EF4-FFF2-40B4-BE49-F238E27FC236}">
+                <a16:creationId xmlns:a16="http://schemas.microsoft.com/office/drawing/2014/main" id="{C32FA66A-E5A8-4856-9124-77BB9488EAE1}"/>
+              </a:ext>
+            </a:extLst>
+          </p:cNvPr>
+          <p:cNvSpPr>
+            <a:spLocks noGrp="1"/>
+          </p:cNvSpPr>
+          <p:nvPr>
+            <p:ph type="dt" sz="half" idx="10"/>
+          </p:nvPr>
+        </p:nvSpPr>
+        <p:spPr>
+          <a:xfrm>
+            <a:off x="838200" y="6356350"/>
+            <a:ext cx="2743200" cy="365125"/>
+          </a:xfrm>
+        </p:spPr>
+        <p:txBody>
+          <a:bodyPr/>
+          <a:lstStyle/>
+          <a:p>
+            <a:r>
+              <a:rPr lang="es-ES" dirty="0"/>
+              <a:t>14/09/2017</a:t>
+            </a:r>
+          </a:p>
+        </p:txBody>
+      </p:sp>
     </p:spTree>
     <p:extLst>
       <p:ext uri="{BB962C8B-B14F-4D97-AF65-F5344CB8AC3E}">
@@ -18612,39 +18853,6 @@
       </p:sp>
       <p:sp>
         <p:nvSpPr>
-          <p:cNvPr id="23" name="Marcador de fecha 3">
-            <a:extLst>
-              <a:ext uri="{FF2B5EF4-FFF2-40B4-BE49-F238E27FC236}">
-                <a16:creationId xmlns:a16="http://schemas.microsoft.com/office/drawing/2014/main" id="{E51FF9E2-0149-4619-9464-B6460754077F}"/>
-              </a:ext>
-            </a:extLst>
-          </p:cNvPr>
-          <p:cNvSpPr>
-            <a:spLocks noGrp="1"/>
-          </p:cNvSpPr>
-          <p:nvPr>
-            <p:ph type="dt" sz="half" idx="10"/>
-          </p:nvPr>
-        </p:nvSpPr>
-        <p:spPr>
-          <a:xfrm>
-            <a:off x="838200" y="6356350"/>
-            <a:ext cx="2743200" cy="365125"/>
-          </a:xfrm>
-        </p:spPr>
-        <p:txBody>
-          <a:bodyPr/>
-          <a:lstStyle/>
-          <a:p>
-            <a:r>
-              <a:rPr lang="es-ES" dirty="0"/>
-              <a:t>15/09/2017</a:t>
-            </a:r>
-          </a:p>
-        </p:txBody>
-      </p:sp>
-      <p:sp>
-        <p:nvSpPr>
           <p:cNvPr id="32" name="Marcador de pie de página 4">
             <a:extLst>
               <a:ext uri="{FF2B5EF4-FFF2-40B4-BE49-F238E27FC236}">
@@ -18727,6 +18935,39 @@
           </a:prstGeom>
         </p:spPr>
       </p:pic>
+      <p:sp>
+        <p:nvSpPr>
+          <p:cNvPr id="8" name="Marcador de fecha 3">
+            <a:extLst>
+              <a:ext uri="{FF2B5EF4-FFF2-40B4-BE49-F238E27FC236}">
+                <a16:creationId xmlns:a16="http://schemas.microsoft.com/office/drawing/2014/main" id="{15CFDB73-533C-4945-B8A3-EF26F31FB7CF}"/>
+              </a:ext>
+            </a:extLst>
+          </p:cNvPr>
+          <p:cNvSpPr>
+            <a:spLocks noGrp="1"/>
+          </p:cNvSpPr>
+          <p:nvPr>
+            <p:ph type="dt" sz="half" idx="10"/>
+          </p:nvPr>
+        </p:nvSpPr>
+        <p:spPr>
+          <a:xfrm>
+            <a:off x="838200" y="6356350"/>
+            <a:ext cx="2743200" cy="365125"/>
+          </a:xfrm>
+        </p:spPr>
+        <p:txBody>
+          <a:bodyPr/>
+          <a:lstStyle/>
+          <a:p>
+            <a:r>
+              <a:rPr lang="es-ES" dirty="0"/>
+              <a:t>14/09/2017</a:t>
+            </a:r>
+          </a:p>
+        </p:txBody>
+      </p:sp>
     </p:spTree>
     <p:extLst>
       <p:ext uri="{BB962C8B-B14F-4D97-AF65-F5344CB8AC3E}">
@@ -19590,39 +19831,6 @@
       </p:sp>
       <p:sp>
         <p:nvSpPr>
-          <p:cNvPr id="23" name="Marcador de fecha 3">
-            <a:extLst>
-              <a:ext uri="{FF2B5EF4-FFF2-40B4-BE49-F238E27FC236}">
-                <a16:creationId xmlns:a16="http://schemas.microsoft.com/office/drawing/2014/main" id="{E51FF9E2-0149-4619-9464-B6460754077F}"/>
-              </a:ext>
-            </a:extLst>
-          </p:cNvPr>
-          <p:cNvSpPr>
-            <a:spLocks noGrp="1"/>
-          </p:cNvSpPr>
-          <p:nvPr>
-            <p:ph type="dt" sz="half" idx="10"/>
-          </p:nvPr>
-        </p:nvSpPr>
-        <p:spPr>
-          <a:xfrm>
-            <a:off x="838200" y="6356350"/>
-            <a:ext cx="2743200" cy="365125"/>
-          </a:xfrm>
-        </p:spPr>
-        <p:txBody>
-          <a:bodyPr/>
-          <a:lstStyle/>
-          <a:p>
-            <a:r>
-              <a:rPr lang="es-ES" dirty="0"/>
-              <a:t>15/09/2017</a:t>
-            </a:r>
-          </a:p>
-        </p:txBody>
-      </p:sp>
-      <p:sp>
-        <p:nvSpPr>
           <p:cNvPr id="32" name="Marcador de pie de página 4">
             <a:extLst>
               <a:ext uri="{FF2B5EF4-FFF2-40B4-BE49-F238E27FC236}">
@@ -19672,6 +19880,39 @@
               <a:t>modelo</a:t>
             </a:r>
             <a:endParaRPr lang="es-ES" dirty="0"/>
+          </a:p>
+        </p:txBody>
+      </p:sp>
+      <p:sp>
+        <p:nvSpPr>
+          <p:cNvPr id="33" name="Marcador de fecha 3">
+            <a:extLst>
+              <a:ext uri="{FF2B5EF4-FFF2-40B4-BE49-F238E27FC236}">
+                <a16:creationId xmlns:a16="http://schemas.microsoft.com/office/drawing/2014/main" id="{EF9C5D58-D8EB-462D-BA89-09A49BBBEBE4}"/>
+              </a:ext>
+            </a:extLst>
+          </p:cNvPr>
+          <p:cNvSpPr>
+            <a:spLocks noGrp="1"/>
+          </p:cNvSpPr>
+          <p:nvPr>
+            <p:ph type="dt" sz="half" idx="10"/>
+          </p:nvPr>
+        </p:nvSpPr>
+        <p:spPr>
+          <a:xfrm>
+            <a:off x="838200" y="6356350"/>
+            <a:ext cx="2743200" cy="365125"/>
+          </a:xfrm>
+        </p:spPr>
+        <p:txBody>
+          <a:bodyPr/>
+          <a:lstStyle/>
+          <a:p>
+            <a:r>
+              <a:rPr lang="es-ES" dirty="0"/>
+              <a:t>14/09/2017</a:t>
+            </a:r>
           </a:p>
         </p:txBody>
       </p:sp>
@@ -19807,39 +20048,6 @@
               <a:t>8</a:t>
             </a:fld>
             <a:endParaRPr lang="es-ES"/>
-          </a:p>
-        </p:txBody>
-      </p:sp>
-      <p:sp>
-        <p:nvSpPr>
-          <p:cNvPr id="23" name="Marcador de fecha 3">
-            <a:extLst>
-              <a:ext uri="{FF2B5EF4-FFF2-40B4-BE49-F238E27FC236}">
-                <a16:creationId xmlns:a16="http://schemas.microsoft.com/office/drawing/2014/main" id="{E51FF9E2-0149-4619-9464-B6460754077F}"/>
-              </a:ext>
-            </a:extLst>
-          </p:cNvPr>
-          <p:cNvSpPr>
-            <a:spLocks noGrp="1"/>
-          </p:cNvSpPr>
-          <p:nvPr>
-            <p:ph type="dt" sz="half" idx="10"/>
-          </p:nvPr>
-        </p:nvSpPr>
-        <p:spPr>
-          <a:xfrm>
-            <a:off x="838200" y="6356350"/>
-            <a:ext cx="2743200" cy="365125"/>
-          </a:xfrm>
-        </p:spPr>
-        <p:txBody>
-          <a:bodyPr/>
-          <a:lstStyle/>
-          <a:p>
-            <a:r>
-              <a:rPr lang="es-ES" dirty="0"/>
-              <a:t>15/09/2017</a:t>
-            </a:r>
           </a:p>
         </p:txBody>
       </p:sp>
@@ -20184,6 +20392,39 @@
           </a:prstGeom>
         </p:spPr>
       </p:pic>
+      <p:sp>
+        <p:nvSpPr>
+          <p:cNvPr id="15" name="Marcador de fecha 3">
+            <a:extLst>
+              <a:ext uri="{FF2B5EF4-FFF2-40B4-BE49-F238E27FC236}">
+                <a16:creationId xmlns:a16="http://schemas.microsoft.com/office/drawing/2014/main" id="{5E8E04ED-D6F7-430E-88A7-ADB63B967A26}"/>
+              </a:ext>
+            </a:extLst>
+          </p:cNvPr>
+          <p:cNvSpPr>
+            <a:spLocks noGrp="1"/>
+          </p:cNvSpPr>
+          <p:nvPr>
+            <p:ph type="dt" sz="half" idx="10"/>
+          </p:nvPr>
+        </p:nvSpPr>
+        <p:spPr>
+          <a:xfrm>
+            <a:off x="838200" y="6356350"/>
+            <a:ext cx="2743200" cy="365125"/>
+          </a:xfrm>
+        </p:spPr>
+        <p:txBody>
+          <a:bodyPr/>
+          <a:lstStyle/>
+          <a:p>
+            <a:r>
+              <a:rPr lang="es-ES" dirty="0"/>
+              <a:t>14/09/2017</a:t>
+            </a:r>
+          </a:p>
+        </p:txBody>
+      </p:sp>
     </p:spTree>
     <p:extLst>
       <p:ext uri="{BB962C8B-B14F-4D97-AF65-F5344CB8AC3E}">
@@ -20280,39 +20521,6 @@
               <a:t>9</a:t>
             </a:fld>
             <a:endParaRPr lang="es-ES"/>
-          </a:p>
-        </p:txBody>
-      </p:sp>
-      <p:sp>
-        <p:nvSpPr>
-          <p:cNvPr id="23" name="Marcador de fecha 3">
-            <a:extLst>
-              <a:ext uri="{FF2B5EF4-FFF2-40B4-BE49-F238E27FC236}">
-                <a16:creationId xmlns:a16="http://schemas.microsoft.com/office/drawing/2014/main" id="{E51FF9E2-0149-4619-9464-B6460754077F}"/>
-              </a:ext>
-            </a:extLst>
-          </p:cNvPr>
-          <p:cNvSpPr>
-            <a:spLocks noGrp="1"/>
-          </p:cNvSpPr>
-          <p:nvPr>
-            <p:ph type="dt" sz="half" idx="10"/>
-          </p:nvPr>
-        </p:nvSpPr>
-        <p:spPr>
-          <a:xfrm>
-            <a:off x="838200" y="6356350"/>
-            <a:ext cx="2743200" cy="365125"/>
-          </a:xfrm>
-        </p:spPr>
-        <p:txBody>
-          <a:bodyPr/>
-          <a:lstStyle/>
-          <a:p>
-            <a:r>
-              <a:rPr lang="es-ES" dirty="0"/>
-              <a:t>15/09/2017</a:t>
-            </a:r>
           </a:p>
         </p:txBody>
       </p:sp>
@@ -20529,6 +20737,39 @@
           </a:prstGeom>
         </p:spPr>
       </p:pic>
+      <p:sp>
+        <p:nvSpPr>
+          <p:cNvPr id="10" name="Marcador de fecha 3">
+            <a:extLst>
+              <a:ext uri="{FF2B5EF4-FFF2-40B4-BE49-F238E27FC236}">
+                <a16:creationId xmlns:a16="http://schemas.microsoft.com/office/drawing/2014/main" id="{067D4CB4-5FA3-4DE5-970B-854FA1D0E8CB}"/>
+              </a:ext>
+            </a:extLst>
+          </p:cNvPr>
+          <p:cNvSpPr>
+            <a:spLocks noGrp="1"/>
+          </p:cNvSpPr>
+          <p:nvPr>
+            <p:ph type="dt" sz="half" idx="10"/>
+          </p:nvPr>
+        </p:nvSpPr>
+        <p:spPr>
+          <a:xfrm>
+            <a:off x="838200" y="6356350"/>
+            <a:ext cx="2743200" cy="365125"/>
+          </a:xfrm>
+        </p:spPr>
+        <p:txBody>
+          <a:bodyPr/>
+          <a:lstStyle/>
+          <a:p>
+            <a:r>
+              <a:rPr lang="es-ES" dirty="0"/>
+              <a:t>14/09/2017</a:t>
+            </a:r>
+          </a:p>
+        </p:txBody>
+      </p:sp>
     </p:spTree>
     <p:extLst>
       <p:ext uri="{BB962C8B-B14F-4D97-AF65-F5344CB8AC3E}">
@@ -21720,4 +21961,299 @@
     </a:ext>
   </a:extLst>
 </a:theme>
+</file>
+
+<file path=ppt/theme/theme5.xml><?xml version="1.0" encoding="utf-8"?>
+<a:theme xmlns:a="http://schemas.openxmlformats.org/drawingml/2006/main" name="Tema de Office">
+  <a:themeElements>
+    <a:clrScheme name="Office">
+      <a:dk1>
+        <a:sysClr val="windowText" lastClr="000000"/>
+      </a:dk1>
+      <a:lt1>
+        <a:sysClr val="window" lastClr="FFFFFF"/>
+      </a:lt1>
+      <a:dk2>
+        <a:srgbClr val="44546A"/>
+      </a:dk2>
+      <a:lt2>
+        <a:srgbClr val="E7E6E6"/>
+      </a:lt2>
+      <a:accent1>
+        <a:srgbClr val="4472C4"/>
+      </a:accent1>
+      <a:accent2>
+        <a:srgbClr val="ED7D31"/>
+      </a:accent2>
+      <a:accent3>
+        <a:srgbClr val="A5A5A5"/>
+      </a:accent3>
+      <a:accent4>
+        <a:srgbClr val="FFC000"/>
+      </a:accent4>
+      <a:accent5>
+        <a:srgbClr val="5B9BD5"/>
+      </a:accent5>
+      <a:accent6>
+        <a:srgbClr val="70AD47"/>
+      </a:accent6>
+      <a:hlink>
+        <a:srgbClr val="0563C1"/>
+      </a:hlink>
+      <a:folHlink>
+        <a:srgbClr val="954F72"/>
+      </a:folHlink>
+    </a:clrScheme>
+    <a:fontScheme name="Office">
+      <a:majorFont>
+        <a:latin typeface="Calibri Light" panose="020F0302020204030204"/>
+        <a:ea typeface=""/>
+        <a:cs typeface=""/>
+        <a:font script="Jpan" typeface="游ゴシック Light"/>
+        <a:font script="Hang" typeface="맑은 고딕"/>
+        <a:font script="Hans" typeface="等线 Light"/>
+        <a:font script="Hant" typeface="新細明體"/>
+        <a:font script="Arab" typeface="Times New Roman"/>
+        <a:font script="Hebr" typeface="Times New Roman"/>
+        <a:font script="Thai" typeface="Angsana New"/>
+        <a:font script="Ethi" typeface="Nyala"/>
+        <a:font script="Beng" typeface="Vrinda"/>
+        <a:font script="Gujr" typeface="Shruti"/>
+        <a:font script="Khmr" typeface="MoolBoran"/>
+        <a:font script="Knda" typeface="Tunga"/>
+        <a:font script="Guru" typeface="Raavi"/>
+        <a:font script="Cans" typeface="Euphemia"/>
+        <a:font script="Cher" typeface="Plantagenet Cherokee"/>
+        <a:font script="Yiii" typeface="Microsoft Yi Baiti"/>
+        <a:font script="Tibt" typeface="Microsoft Himalaya"/>
+        <a:font script="Thaa" typeface="MV Boli"/>
+        <a:font script="Deva" typeface="Mangal"/>
+        <a:font script="Telu" typeface="Gautami"/>
+        <a:font script="Taml" typeface="Latha"/>
+        <a:font script="Syrc" typeface="Estrangelo Edessa"/>
+        <a:font script="Orya" typeface="Kalinga"/>
+        <a:font script="Mlym" typeface="Kartika"/>
+        <a:font script="Laoo" typeface="DokChampa"/>
+        <a:font script="Sinh" typeface="Iskoola Pota"/>
+        <a:font script="Mong" typeface="Mongolian Baiti"/>
+        <a:font script="Viet" typeface="Times New Roman"/>
+        <a:font script="Uigh" typeface="Microsoft Uighur"/>
+        <a:font script="Geor" typeface="Sylfaen"/>
+        <a:font script="Armn" typeface="Arial"/>
+        <a:font script="Bugi" typeface="Leelawadee UI"/>
+        <a:font script="Bopo" typeface="Microsoft JhengHei"/>
+        <a:font script="Java" typeface="Javanese Text"/>
+        <a:font script="Lisu" typeface="Segoe UI"/>
+        <a:font script="Mymr" typeface="Myanmar Text"/>
+        <a:font script="Nkoo" typeface="Ebrima"/>
+        <a:font script="Olck" typeface="Nirmala UI"/>
+        <a:font script="Osma" typeface="Ebrima"/>
+        <a:font script="Phag" typeface="Phagspa"/>
+        <a:font script="Syrn" typeface="Estrangelo Edessa"/>
+        <a:font script="Syrj" typeface="Estrangelo Edessa"/>
+        <a:font script="Syre" typeface="Estrangelo Edessa"/>
+        <a:font script="Sora" typeface="Nirmala UI"/>
+        <a:font script="Tale" typeface="Microsoft Tai Le"/>
+        <a:font script="Talu" typeface="Microsoft New Tai Lue"/>
+        <a:font script="Tfng" typeface="Ebrima"/>
+      </a:majorFont>
+      <a:minorFont>
+        <a:latin typeface="Calibri" panose="020F0502020204030204"/>
+        <a:ea typeface=""/>
+        <a:cs typeface=""/>
+        <a:font script="Jpan" typeface="游ゴシック"/>
+        <a:font script="Hang" typeface="맑은 고딕"/>
+        <a:font script="Hans" typeface="等线"/>
+        <a:font script="Hant" typeface="新細明體"/>
+        <a:font script="Arab" typeface="Arial"/>
+        <a:font script="Hebr" typeface="Arial"/>
+        <a:font script="Thai" typeface="Cordia New"/>
+        <a:font script="Ethi" typeface="Nyala"/>
+        <a:font script="Beng" typeface="Vrinda"/>
+        <a:font script="Gujr" typeface="Shruti"/>
+        <a:font script="Khmr" typeface="DaunPenh"/>
+        <a:font script="Knda" typeface="Tunga"/>
+        <a:font script="Guru" typeface="Raavi"/>
+        <a:font script="Cans" typeface="Euphemia"/>
+        <a:font script="Cher" typeface="Plantagenet Cherokee"/>
+        <a:font script="Yiii" typeface="Microsoft Yi Baiti"/>
+        <a:font script="Tibt" typeface="Microsoft Himalaya"/>
+        <a:font script="Thaa" typeface="MV Boli"/>
+        <a:font script="Deva" typeface="Mangal"/>
+        <a:font script="Telu" typeface="Gautami"/>
+        <a:font script="Taml" typeface="Latha"/>
+        <a:font script="Syrc" typeface="Estrangelo Edessa"/>
+        <a:font script="Orya" typeface="Kalinga"/>
+        <a:font script="Mlym" typeface="Kartika"/>
+        <a:font script="Laoo" typeface="DokChampa"/>
+        <a:font script="Sinh" typeface="Iskoola Pota"/>
+        <a:font script="Mong" typeface="Mongolian Baiti"/>
+        <a:font script="Viet" typeface="Arial"/>
+        <a:font script="Uigh" typeface="Microsoft Uighur"/>
+        <a:font script="Geor" typeface="Sylfaen"/>
+        <a:font script="Armn" typeface="Arial"/>
+        <a:font script="Bugi" typeface="Leelawadee UI"/>
+        <a:font script="Bopo" typeface="Microsoft JhengHei"/>
+        <a:font script="Java" typeface="Javanese Text"/>
+        <a:font script="Lisu" typeface="Segoe UI"/>
+        <a:font script="Mymr" typeface="Myanmar Text"/>
+        <a:font script="Nkoo" typeface="Ebrima"/>
+        <a:font script="Olck" typeface="Nirmala UI"/>
+        <a:font script="Osma" typeface="Ebrima"/>
+        <a:font script="Phag" typeface="Phagspa"/>
+        <a:font script="Syrn" typeface="Estrangelo Edessa"/>
+        <a:font script="Syrj" typeface="Estrangelo Edessa"/>
+        <a:font script="Syre" typeface="Estrangelo Edessa"/>
+        <a:font script="Sora" typeface="Nirmala UI"/>
+        <a:font script="Tale" typeface="Microsoft Tai Le"/>
+        <a:font script="Talu" typeface="Microsoft New Tai Lue"/>
+        <a:font script="Tfng" typeface="Ebrima"/>
+      </a:minorFont>
+    </a:fontScheme>
+    <a:fmtScheme name="Office">
+      <a:fillStyleLst>
+        <a:solidFill>
+          <a:schemeClr val="phClr"/>
+        </a:solidFill>
+        <a:gradFill rotWithShape="1">
+          <a:gsLst>
+            <a:gs pos="0">
+              <a:schemeClr val="phClr">
+                <a:lumMod val="110000"/>
+                <a:satMod val="105000"/>
+                <a:tint val="67000"/>
+              </a:schemeClr>
+            </a:gs>
+            <a:gs pos="50000">
+              <a:schemeClr val="phClr">
+                <a:lumMod val="105000"/>
+                <a:satMod val="103000"/>
+                <a:tint val="73000"/>
+              </a:schemeClr>
+            </a:gs>
+            <a:gs pos="100000">
+              <a:schemeClr val="phClr">
+                <a:lumMod val="105000"/>
+                <a:satMod val="109000"/>
+                <a:tint val="81000"/>
+              </a:schemeClr>
+            </a:gs>
+          </a:gsLst>
+          <a:lin ang="5400000" scaled="0"/>
+        </a:gradFill>
+        <a:gradFill rotWithShape="1">
+          <a:gsLst>
+            <a:gs pos="0">
+              <a:schemeClr val="phClr">
+                <a:satMod val="103000"/>
+                <a:lumMod val="102000"/>
+                <a:tint val="94000"/>
+              </a:schemeClr>
+            </a:gs>
+            <a:gs pos="50000">
+              <a:schemeClr val="phClr">
+                <a:satMod val="110000"/>
+                <a:lumMod val="100000"/>
+                <a:shade val="100000"/>
+              </a:schemeClr>
+            </a:gs>
+            <a:gs pos="100000">
+              <a:schemeClr val="phClr">
+                <a:lumMod val="99000"/>
+                <a:satMod val="120000"/>
+                <a:shade val="78000"/>
+              </a:schemeClr>
+            </a:gs>
+          </a:gsLst>
+          <a:lin ang="5400000" scaled="0"/>
+        </a:gradFill>
+      </a:fillStyleLst>
+      <a:lnStyleLst>
+        <a:ln w="6350" cap="flat" cmpd="sng" algn="ctr">
+          <a:solidFill>
+            <a:schemeClr val="phClr"/>
+          </a:solidFill>
+          <a:prstDash val="solid"/>
+          <a:miter lim="800000"/>
+        </a:ln>
+        <a:ln w="12700" cap="flat" cmpd="sng" algn="ctr">
+          <a:solidFill>
+            <a:schemeClr val="phClr"/>
+          </a:solidFill>
+          <a:prstDash val="solid"/>
+          <a:miter lim="800000"/>
+        </a:ln>
+        <a:ln w="19050" cap="flat" cmpd="sng" algn="ctr">
+          <a:solidFill>
+            <a:schemeClr val="phClr"/>
+          </a:solidFill>
+          <a:prstDash val="solid"/>
+          <a:miter lim="800000"/>
+        </a:ln>
+      </a:lnStyleLst>
+      <a:effectStyleLst>
+        <a:effectStyle>
+          <a:effectLst/>
+        </a:effectStyle>
+        <a:effectStyle>
+          <a:effectLst/>
+        </a:effectStyle>
+        <a:effectStyle>
+          <a:effectLst>
+            <a:outerShdw blurRad="57150" dist="19050" dir="5400000" algn="ctr" rotWithShape="0">
+              <a:srgbClr val="000000">
+                <a:alpha val="63000"/>
+              </a:srgbClr>
+            </a:outerShdw>
+          </a:effectLst>
+        </a:effectStyle>
+      </a:effectStyleLst>
+      <a:bgFillStyleLst>
+        <a:solidFill>
+          <a:schemeClr val="phClr"/>
+        </a:solidFill>
+        <a:solidFill>
+          <a:schemeClr val="phClr">
+            <a:tint val="95000"/>
+            <a:satMod val="170000"/>
+          </a:schemeClr>
+        </a:solidFill>
+        <a:gradFill rotWithShape="1">
+          <a:gsLst>
+            <a:gs pos="0">
+              <a:schemeClr val="phClr">
+                <a:tint val="93000"/>
+                <a:satMod val="150000"/>
+                <a:shade val="98000"/>
+                <a:lumMod val="102000"/>
+              </a:schemeClr>
+            </a:gs>
+            <a:gs pos="50000">
+              <a:schemeClr val="phClr">
+                <a:tint val="98000"/>
+                <a:satMod val="130000"/>
+                <a:shade val="90000"/>
+                <a:lumMod val="103000"/>
+              </a:schemeClr>
+            </a:gs>
+            <a:gs pos="100000">
+              <a:schemeClr val="phClr">
+                <a:shade val="63000"/>
+                <a:satMod val="120000"/>
+              </a:schemeClr>
+            </a:gs>
+          </a:gsLst>
+          <a:lin ang="5400000" scaled="0"/>
+        </a:gradFill>
+      </a:bgFillStyleLst>
+    </a:fmtScheme>
+  </a:themeElements>
+  <a:objectDefaults/>
+  <a:extraClrSchemeLst/>
+  <a:extLst>
+    <a:ext uri="{05A4C25C-085E-4340-85A3-A5531E510DB2}">
+      <thm15:themeFamily xmlns:thm15="http://schemas.microsoft.com/office/thememl/2012/main" name="Office Theme" id="{62F939B6-93AF-4DB8-9C6B-D6C7DFDC589F}" vid="{4A3C46E8-61CC-4603-A589-7422A47A8E4A}"/>
+    </a:ext>
+  </a:extLst>
+</a:theme>
 </file>
</xml_diff>

<commit_message>
added new comments to slides
</commit_message>
<xml_diff>
--- a/slides/TFM.pptx
+++ b/slides/TFM.pptx
@@ -125,6 +125,9 @@
   <p:extLst>
     <p:ext uri="{EFAFB233-063F-42B5-8137-9DF3F51BA10A}">
       <p15:sldGuideLst xmlns:p15="http://schemas.microsoft.com/office/powerpoint/2012/main"/>
+    </p:ext>
+    <p:ext uri="{2D200454-40CA-4A62-9FC3-DE9A4176ACB9}">
+      <p15:notesGuideLst xmlns:p15="http://schemas.microsoft.com/office/powerpoint/2012/main"/>
     </p:ext>
   </p:extLst>
 </p:presentation>
@@ -3425,7 +3428,7 @@
   <dgm:whole/>
   <dgm:extLst>
     <a:ext uri="http://schemas.microsoft.com/office/drawing/2008/diagram">
-      <dsp:dataModelExt xmlns:dsp="http://schemas.microsoft.com/office/drawing/2008/diagram" relId="rId6" minVer="http://schemas.openxmlformats.org/drawingml/2006/diagram"/>
+      <dsp:dataModelExt xmlns:dsp="http://schemas.microsoft.com/office/drawing/2008/diagram" relId="rId7" minVer="http://schemas.openxmlformats.org/drawingml/2006/diagram"/>
     </a:ext>
   </dgm:extLst>
 </dgm:dataModel>
@@ -10446,6 +10449,947 @@
           <a:bodyPr/>
           <a:lstStyle/>
           <a:p>
+            <a:r>
+              <a:rPr lang="es-ES" dirty="0"/>
+              <a:t>Buenos días, la presentación que voy a exponer constará de 2 partes:</a:t>
+            </a:r>
+          </a:p>
+          <a:p>
+            <a:endParaRPr lang="es-ES" dirty="0"/>
+          </a:p>
+          <a:p>
+            <a:r>
+              <a:rPr lang="es-ES" dirty="0"/>
+              <a:t>	- La primera en la que explicaré los objetivos que se han perseguido en el presente trabajo, así como qué tecnologías he empleado y el desarrollo del trabajo.</a:t>
+            </a:r>
+          </a:p>
+          <a:p>
+            <a:r>
+              <a:rPr lang="es-ES" dirty="0"/>
+              <a:t>	- La segunda en la que se llevará a cabo una simulación para ver los resultados.</a:t>
+            </a:r>
+          </a:p>
+          <a:p>
+            <a:endParaRPr lang="es-ES" dirty="0"/>
+          </a:p>
+          <a:p>
+            <a:r>
+              <a:rPr lang="es-ES" dirty="0"/>
+              <a:t>Como viene indicado, este trabajo trata de la visualización en </a:t>
+            </a:r>
+            <a:r>
+              <a:rPr lang="es-ES" dirty="0" err="1"/>
+              <a:t>streaming</a:t>
+            </a:r>
+            <a:r>
+              <a:rPr lang="es-ES" dirty="0"/>
+              <a:t> de la evaluación de un modelo. El modelo creado es un modelo de clasificación que clasificará paquetes de red según su fuente de origen.</a:t>
+            </a:r>
+          </a:p>
+        </p:txBody>
+      </p:sp>
+      <p:sp>
+        <p:nvSpPr>
+          <p:cNvPr id="4" name="Marcador de número de diapositiva 3"/>
+          <p:cNvSpPr>
+            <a:spLocks noGrp="1"/>
+          </p:cNvSpPr>
+          <p:nvPr>
+            <p:ph type="sldNum" sz="quarter" idx="10"/>
+          </p:nvPr>
+        </p:nvSpPr>
+        <p:spPr/>
+        <p:txBody>
+          <a:bodyPr/>
+          <a:lstStyle/>
+          <a:p>
+            <a:fld id="{0A39E505-5E6B-4B15-B11C-28AB1E673129}" type="slidenum">
+              <a:rPr lang="es-ES" smtClean="0"/>
+              <a:t>1</a:t>
+            </a:fld>
+            <a:endParaRPr lang="es-ES"/>
+          </a:p>
+        </p:txBody>
+      </p:sp>
+    </p:spTree>
+    <p:extLst>
+      <p:ext uri="{BB962C8B-B14F-4D97-AF65-F5344CB8AC3E}">
+        <p14:creationId xmlns:p14="http://schemas.microsoft.com/office/powerpoint/2010/main" val="3862555604"/>
+      </p:ext>
+    </p:extLst>
+  </p:cSld>
+  <p:clrMapOvr>
+    <a:masterClrMapping/>
+  </p:clrMapOvr>
+</p:notes>
+</file>
+
+<file path=ppt/notesSlides/notesSlide2.xml><?xml version="1.0" encoding="utf-8"?>
+<p:notes xmlns:a="http://schemas.openxmlformats.org/drawingml/2006/main" xmlns:r="http://schemas.openxmlformats.org/officeDocument/2006/relationships" xmlns:p="http://schemas.openxmlformats.org/presentationml/2006/main">
+  <p:cSld>
+    <p:spTree>
+      <p:nvGrpSpPr>
+        <p:cNvPr id="1" name=""/>
+        <p:cNvGrpSpPr/>
+        <p:nvPr/>
+      </p:nvGrpSpPr>
+      <p:grpSpPr>
+        <a:xfrm>
+          <a:off x="0" y="0"/>
+          <a:ext cx="0" cy="0"/>
+          <a:chOff x="0" y="0"/>
+          <a:chExt cx="0" cy="0"/>
+        </a:xfrm>
+      </p:grpSpPr>
+      <p:sp>
+        <p:nvSpPr>
+          <p:cNvPr id="2" name="Marcador de imagen de diapositiva 1"/>
+          <p:cNvSpPr>
+            <a:spLocks noGrp="1" noRot="1" noChangeAspect="1"/>
+          </p:cNvSpPr>
+          <p:nvPr>
+            <p:ph type="sldImg"/>
+          </p:nvPr>
+        </p:nvSpPr>
+        <p:spPr/>
+      </p:sp>
+      <p:sp>
+        <p:nvSpPr>
+          <p:cNvPr id="3" name="Marcador de notas 2"/>
+          <p:cNvSpPr>
+            <a:spLocks noGrp="1"/>
+          </p:cNvSpPr>
+          <p:nvPr>
+            <p:ph type="body" idx="1"/>
+          </p:nvPr>
+        </p:nvSpPr>
+        <p:spPr/>
+        <p:txBody>
+          <a:bodyPr/>
+          <a:lstStyle/>
+          <a:p>
+            <a:r>
+              <a:rPr lang="es-ES" dirty="0"/>
+              <a:t>Los objetivos que se han intentado conseguir con este trabajo son</a:t>
+            </a:r>
+          </a:p>
+          <a:p>
+            <a:r>
+              <a:rPr lang="es-ES" dirty="0"/>
+              <a:t>Obj1</a:t>
+            </a:r>
+          </a:p>
+          <a:p>
+            <a:r>
+              <a:rPr lang="es-ES" dirty="0"/>
+              <a:t>	realizar un análisis de un </a:t>
+            </a:r>
+            <a:r>
+              <a:rPr lang="es-ES" dirty="0" err="1"/>
+              <a:t>dataset</a:t>
+            </a:r>
+            <a:r>
+              <a:rPr lang="es-ES" dirty="0"/>
+              <a:t> con datos de red.</a:t>
+            </a:r>
+          </a:p>
+          <a:p>
+            <a:pPr marL="0" marR="0" lvl="0" indent="0" algn="l" defTabSz="914400" rtl="0" eaLnBrk="1" fontAlgn="auto" latinLnBrk="0" hangingPunct="1">
+              <a:lnSpc>
+                <a:spcPct val="100000"/>
+              </a:lnSpc>
+              <a:spcBef>
+                <a:spcPts val="0"/>
+              </a:spcBef>
+              <a:spcAft>
+                <a:spcPts val="0"/>
+              </a:spcAft>
+              <a:buClrTx/>
+              <a:buSzTx/>
+              <a:buFontTx/>
+              <a:buNone/>
+              <a:tabLst/>
+              <a:defRPr/>
+            </a:pPr>
+            <a:r>
+              <a:rPr lang="es-ES" dirty="0"/>
+              <a:t>Obj2</a:t>
+            </a:r>
+          </a:p>
+          <a:p>
+            <a:pPr marL="0" marR="0" lvl="0" indent="0" algn="l" defTabSz="914400" rtl="0" eaLnBrk="1" fontAlgn="auto" latinLnBrk="0" hangingPunct="1">
+              <a:lnSpc>
+                <a:spcPct val="100000"/>
+              </a:lnSpc>
+              <a:spcBef>
+                <a:spcPts val="0"/>
+              </a:spcBef>
+              <a:spcAft>
+                <a:spcPts val="0"/>
+              </a:spcAft>
+              <a:buClrTx/>
+              <a:buSzTx/>
+              <a:buFontTx/>
+              <a:buNone/>
+              <a:tabLst/>
+              <a:defRPr/>
+            </a:pPr>
+            <a:r>
+              <a:rPr lang="es-ES" dirty="0"/>
+              <a:t>	la construcción de un modelo que clasifique cada paquete en función de origen, a partir de ciertas características de los paquetes</a:t>
+            </a:r>
+          </a:p>
+          <a:p>
+            <a:pPr marL="0" marR="0" lvl="0" indent="0" algn="l" defTabSz="914400" rtl="0" eaLnBrk="1" fontAlgn="auto" latinLnBrk="0" hangingPunct="1">
+              <a:lnSpc>
+                <a:spcPct val="100000"/>
+              </a:lnSpc>
+              <a:spcBef>
+                <a:spcPts val="0"/>
+              </a:spcBef>
+              <a:spcAft>
+                <a:spcPts val="0"/>
+              </a:spcAft>
+              <a:buClrTx/>
+              <a:buSzTx/>
+              <a:buFontTx/>
+              <a:buNone/>
+              <a:tabLst/>
+              <a:defRPr/>
+            </a:pPr>
+            <a:r>
+              <a:rPr lang="es-ES" dirty="0"/>
+              <a:t>Obj3</a:t>
+            </a:r>
+          </a:p>
+          <a:p>
+            <a:pPr marL="0" marR="0" lvl="0" indent="0" algn="l" defTabSz="914400" rtl="0" eaLnBrk="1" fontAlgn="auto" latinLnBrk="0" hangingPunct="1">
+              <a:lnSpc>
+                <a:spcPct val="100000"/>
+              </a:lnSpc>
+              <a:spcBef>
+                <a:spcPts val="0"/>
+              </a:spcBef>
+              <a:spcAft>
+                <a:spcPts val="0"/>
+              </a:spcAft>
+              <a:buClrTx/>
+              <a:buSzTx/>
+              <a:buFontTx/>
+              <a:buNone/>
+              <a:tabLst/>
+              <a:defRPr/>
+            </a:pPr>
+            <a:r>
+              <a:rPr lang="es-ES" dirty="0"/>
+              <a:t>	juntar diversas tecnologías del ámbito </a:t>
+            </a:r>
+            <a:r>
+              <a:rPr lang="es-ES" dirty="0" err="1"/>
+              <a:t>big</a:t>
+            </a:r>
+            <a:r>
+              <a:rPr lang="es-ES" dirty="0"/>
+              <a:t> data</a:t>
+            </a:r>
+          </a:p>
+          <a:p>
+            <a:pPr marL="0" marR="0" lvl="0" indent="0" algn="l" defTabSz="914400" rtl="0" eaLnBrk="1" fontAlgn="auto" latinLnBrk="0" hangingPunct="1">
+              <a:lnSpc>
+                <a:spcPct val="100000"/>
+              </a:lnSpc>
+              <a:spcBef>
+                <a:spcPts val="0"/>
+              </a:spcBef>
+              <a:spcAft>
+                <a:spcPts val="0"/>
+              </a:spcAft>
+              <a:buClrTx/>
+              <a:buSzTx/>
+              <a:buFontTx/>
+              <a:buNone/>
+              <a:tabLst/>
+              <a:defRPr/>
+            </a:pPr>
+            <a:r>
+              <a:rPr lang="es-ES" dirty="0"/>
+              <a:t>Obj4</a:t>
+            </a:r>
+          </a:p>
+          <a:p>
+            <a:pPr marL="0" marR="0" lvl="0" indent="0" algn="l" defTabSz="914400" rtl="0" eaLnBrk="1" fontAlgn="auto" latinLnBrk="0" hangingPunct="1">
+              <a:lnSpc>
+                <a:spcPct val="100000"/>
+              </a:lnSpc>
+              <a:spcBef>
+                <a:spcPts val="0"/>
+              </a:spcBef>
+              <a:spcAft>
+                <a:spcPts val="0"/>
+              </a:spcAft>
+              <a:buClrTx/>
+              <a:buSzTx/>
+              <a:buFontTx/>
+              <a:buNone/>
+              <a:tabLst/>
+              <a:defRPr/>
+            </a:pPr>
+            <a:endParaRPr lang="es-ES" dirty="0"/>
+          </a:p>
+          <a:p>
+            <a:pPr marL="0" marR="0" lvl="0" indent="0" algn="l" defTabSz="914400" rtl="0" eaLnBrk="1" fontAlgn="auto" latinLnBrk="0" hangingPunct="1">
+              <a:lnSpc>
+                <a:spcPct val="100000"/>
+              </a:lnSpc>
+              <a:spcBef>
+                <a:spcPts val="0"/>
+              </a:spcBef>
+              <a:spcAft>
+                <a:spcPts val="0"/>
+              </a:spcAft>
+              <a:buClrTx/>
+              <a:buSzTx/>
+              <a:buFontTx/>
+              <a:buNone/>
+              <a:tabLst/>
+              <a:defRPr/>
+            </a:pPr>
+            <a:r>
+              <a:rPr lang="es-ES" dirty="0"/>
+              <a:t>	poder ver los resultados en </a:t>
+            </a:r>
+            <a:r>
+              <a:rPr lang="es-ES" dirty="0" err="1"/>
+              <a:t>streaming</a:t>
+            </a:r>
+            <a:r>
+              <a:rPr lang="es-ES" dirty="0"/>
+              <a:t>, que es algo bastante a la orden del día</a:t>
+            </a:r>
+          </a:p>
+          <a:p>
+            <a:pPr marL="0" marR="0" lvl="0" indent="0" algn="l" defTabSz="914400" rtl="0" eaLnBrk="1" fontAlgn="auto" latinLnBrk="0" hangingPunct="1">
+              <a:lnSpc>
+                <a:spcPct val="100000"/>
+              </a:lnSpc>
+              <a:spcBef>
+                <a:spcPts val="0"/>
+              </a:spcBef>
+              <a:spcAft>
+                <a:spcPts val="0"/>
+              </a:spcAft>
+              <a:buClrTx/>
+              <a:buSzTx/>
+              <a:buFontTx/>
+              <a:buNone/>
+              <a:tabLst/>
+              <a:defRPr/>
+            </a:pPr>
+            <a:endParaRPr lang="es-ES" dirty="0"/>
+          </a:p>
+          <a:p>
+            <a:endParaRPr lang="es-ES" dirty="0"/>
+          </a:p>
+        </p:txBody>
+      </p:sp>
+      <p:sp>
+        <p:nvSpPr>
+          <p:cNvPr id="4" name="Marcador de número de diapositiva 3"/>
+          <p:cNvSpPr>
+            <a:spLocks noGrp="1"/>
+          </p:cNvSpPr>
+          <p:nvPr>
+            <p:ph type="sldNum" sz="quarter" idx="10"/>
+          </p:nvPr>
+        </p:nvSpPr>
+        <p:spPr/>
+        <p:txBody>
+          <a:bodyPr/>
+          <a:lstStyle/>
+          <a:p>
+            <a:fld id="{0A39E505-5E6B-4B15-B11C-28AB1E673129}" type="slidenum">
+              <a:rPr lang="es-ES" smtClean="0"/>
+              <a:t>2</a:t>
+            </a:fld>
+            <a:endParaRPr lang="es-ES"/>
+          </a:p>
+        </p:txBody>
+      </p:sp>
+    </p:spTree>
+    <p:extLst>
+      <p:ext uri="{BB962C8B-B14F-4D97-AF65-F5344CB8AC3E}">
+        <p14:creationId xmlns:p14="http://schemas.microsoft.com/office/powerpoint/2010/main" val="1504810726"/>
+      </p:ext>
+    </p:extLst>
+  </p:cSld>
+  <p:clrMapOvr>
+    <a:masterClrMapping/>
+  </p:clrMapOvr>
+</p:notes>
+</file>
+
+<file path=ppt/notesSlides/notesSlide3.xml><?xml version="1.0" encoding="utf-8"?>
+<p:notes xmlns:a="http://schemas.openxmlformats.org/drawingml/2006/main" xmlns:r="http://schemas.openxmlformats.org/officeDocument/2006/relationships" xmlns:p="http://schemas.openxmlformats.org/presentationml/2006/main">
+  <p:cSld>
+    <p:spTree>
+      <p:nvGrpSpPr>
+        <p:cNvPr id="1" name=""/>
+        <p:cNvGrpSpPr/>
+        <p:nvPr/>
+      </p:nvGrpSpPr>
+      <p:grpSpPr>
+        <a:xfrm>
+          <a:off x="0" y="0"/>
+          <a:ext cx="0" cy="0"/>
+          <a:chOff x="0" y="0"/>
+          <a:chExt cx="0" cy="0"/>
+        </a:xfrm>
+      </p:grpSpPr>
+      <p:sp>
+        <p:nvSpPr>
+          <p:cNvPr id="2" name="Marcador de imagen de diapositiva 1"/>
+          <p:cNvSpPr>
+            <a:spLocks noGrp="1" noRot="1" noChangeAspect="1"/>
+          </p:cNvSpPr>
+          <p:nvPr>
+            <p:ph type="sldImg"/>
+          </p:nvPr>
+        </p:nvSpPr>
+        <p:spPr/>
+      </p:sp>
+      <p:sp>
+        <p:nvSpPr>
+          <p:cNvPr id="3" name="Marcador de notas 2"/>
+          <p:cNvSpPr>
+            <a:spLocks noGrp="1"/>
+          </p:cNvSpPr>
+          <p:nvPr>
+            <p:ph type="body" idx="1"/>
+          </p:nvPr>
+        </p:nvSpPr>
+        <p:spPr/>
+        <p:txBody>
+          <a:bodyPr/>
+          <a:lstStyle/>
+          <a:p>
+            <a:r>
+              <a:rPr lang="es-ES" dirty="0"/>
+              <a:t>El primer paso que se realizo fue la captura de los datos. Las fuentes que se han utilizado son muy concretas. </a:t>
+            </a:r>
+          </a:p>
+          <a:p>
+            <a:r>
+              <a:rPr lang="es-ES" dirty="0"/>
+              <a:t>	Descarga de la página del diario deportivo as.com</a:t>
+            </a:r>
+          </a:p>
+          <a:p>
+            <a:r>
+              <a:rPr lang="es-ES" dirty="0"/>
+              <a:t>	Descarga de video de </a:t>
+            </a:r>
+            <a:r>
+              <a:rPr lang="es-ES" dirty="0" err="1"/>
+              <a:t>youtube</a:t>
+            </a:r>
+            <a:endParaRPr lang="es-ES" dirty="0"/>
+          </a:p>
+          <a:p>
+            <a:r>
+              <a:rPr lang="es-ES" dirty="0"/>
+              <a:t>	Simulación de paquetes IP mediante ping (ajustando la tasa y el tamaño de paquete)</a:t>
+            </a:r>
+          </a:p>
+          <a:p>
+            <a:r>
+              <a:rPr lang="es-ES" dirty="0"/>
+              <a:t>La recogida tuvo lugar con 10 minutos de ejecución de cada una de las fuentes de información</a:t>
+            </a:r>
+          </a:p>
+        </p:txBody>
+      </p:sp>
+      <p:sp>
+        <p:nvSpPr>
+          <p:cNvPr id="4" name="Marcador de número de diapositiva 3"/>
+          <p:cNvSpPr>
+            <a:spLocks noGrp="1"/>
+          </p:cNvSpPr>
+          <p:nvPr>
+            <p:ph type="sldNum" sz="quarter" idx="10"/>
+          </p:nvPr>
+        </p:nvSpPr>
+        <p:spPr/>
+        <p:txBody>
+          <a:bodyPr/>
+          <a:lstStyle/>
+          <a:p>
+            <a:fld id="{0A39E505-5E6B-4B15-B11C-28AB1E673129}" type="slidenum">
+              <a:rPr lang="es-ES" smtClean="0"/>
+              <a:t>3</a:t>
+            </a:fld>
+            <a:endParaRPr lang="es-ES"/>
+          </a:p>
+        </p:txBody>
+      </p:sp>
+    </p:spTree>
+    <p:extLst>
+      <p:ext uri="{BB962C8B-B14F-4D97-AF65-F5344CB8AC3E}">
+        <p14:creationId xmlns:p14="http://schemas.microsoft.com/office/powerpoint/2010/main" val="3436506061"/>
+      </p:ext>
+    </p:extLst>
+  </p:cSld>
+  <p:clrMapOvr>
+    <a:masterClrMapping/>
+  </p:clrMapOvr>
+</p:notes>
+</file>
+
+<file path=ppt/notesSlides/notesSlide4.xml><?xml version="1.0" encoding="utf-8"?>
+<p:notes xmlns:a="http://schemas.openxmlformats.org/drawingml/2006/main" xmlns:r="http://schemas.openxmlformats.org/officeDocument/2006/relationships" xmlns:p="http://schemas.openxmlformats.org/presentationml/2006/main">
+  <p:cSld>
+    <p:spTree>
+      <p:nvGrpSpPr>
+        <p:cNvPr id="1" name=""/>
+        <p:cNvGrpSpPr/>
+        <p:nvPr/>
+      </p:nvGrpSpPr>
+      <p:grpSpPr>
+        <a:xfrm>
+          <a:off x="0" y="0"/>
+          <a:ext cx="0" cy="0"/>
+          <a:chOff x="0" y="0"/>
+          <a:chExt cx="0" cy="0"/>
+        </a:xfrm>
+      </p:grpSpPr>
+      <p:sp>
+        <p:nvSpPr>
+          <p:cNvPr id="2" name="Marcador de imagen de diapositiva 1"/>
+          <p:cNvSpPr>
+            <a:spLocks noGrp="1" noRot="1" noChangeAspect="1"/>
+          </p:cNvSpPr>
+          <p:nvPr>
+            <p:ph type="sldImg"/>
+          </p:nvPr>
+        </p:nvSpPr>
+        <p:spPr/>
+      </p:sp>
+      <p:sp>
+        <p:nvSpPr>
+          <p:cNvPr id="3" name="Marcador de notas 2"/>
+          <p:cNvSpPr>
+            <a:spLocks noGrp="1"/>
+          </p:cNvSpPr>
+          <p:nvPr>
+            <p:ph type="body" idx="1"/>
+          </p:nvPr>
+        </p:nvSpPr>
+        <p:spPr/>
+        <p:txBody>
+          <a:bodyPr/>
+          <a:lstStyle/>
+          <a:p>
+            <a:r>
+              <a:rPr lang="es-ES" dirty="0"/>
+              <a:t>Una vez recogidos los datos, tenemos un </a:t>
+            </a:r>
+            <a:r>
+              <a:rPr lang="es-ES" dirty="0" err="1"/>
+              <a:t>dataset</a:t>
+            </a:r>
+            <a:r>
+              <a:rPr lang="es-ES" dirty="0"/>
+              <a:t> con la siguiente apariencia. (Explicación de las variables)</a:t>
+            </a:r>
+          </a:p>
+        </p:txBody>
+      </p:sp>
+      <p:sp>
+        <p:nvSpPr>
+          <p:cNvPr id="4" name="Marcador de número de diapositiva 3"/>
+          <p:cNvSpPr>
+            <a:spLocks noGrp="1"/>
+          </p:cNvSpPr>
+          <p:nvPr>
+            <p:ph type="sldNum" sz="quarter" idx="10"/>
+          </p:nvPr>
+        </p:nvSpPr>
+        <p:spPr/>
+        <p:txBody>
+          <a:bodyPr/>
+          <a:lstStyle/>
+          <a:p>
+            <a:fld id="{0A39E505-5E6B-4B15-B11C-28AB1E673129}" type="slidenum">
+              <a:rPr lang="es-ES" smtClean="0"/>
+              <a:t>4</a:t>
+            </a:fld>
+            <a:endParaRPr lang="es-ES"/>
+          </a:p>
+        </p:txBody>
+      </p:sp>
+    </p:spTree>
+    <p:extLst>
+      <p:ext uri="{BB962C8B-B14F-4D97-AF65-F5344CB8AC3E}">
+        <p14:creationId xmlns:p14="http://schemas.microsoft.com/office/powerpoint/2010/main" val="2546439586"/>
+      </p:ext>
+    </p:extLst>
+  </p:cSld>
+  <p:clrMapOvr>
+    <a:masterClrMapping/>
+  </p:clrMapOvr>
+</p:notes>
+</file>
+
+<file path=ppt/notesSlides/notesSlide5.xml><?xml version="1.0" encoding="utf-8"?>
+<p:notes xmlns:a="http://schemas.openxmlformats.org/drawingml/2006/main" xmlns:r="http://schemas.openxmlformats.org/officeDocument/2006/relationships" xmlns:p="http://schemas.openxmlformats.org/presentationml/2006/main">
+  <p:cSld>
+    <p:spTree>
+      <p:nvGrpSpPr>
+        <p:cNvPr id="1" name=""/>
+        <p:cNvGrpSpPr/>
+        <p:nvPr/>
+      </p:nvGrpSpPr>
+      <p:grpSpPr>
+        <a:xfrm>
+          <a:off x="0" y="0"/>
+          <a:ext cx="0" cy="0"/>
+          <a:chOff x="0" y="0"/>
+          <a:chExt cx="0" cy="0"/>
+        </a:xfrm>
+      </p:grpSpPr>
+      <p:sp>
+        <p:nvSpPr>
+          <p:cNvPr id="2" name="Marcador de imagen de diapositiva 1"/>
+          <p:cNvSpPr>
+            <a:spLocks noGrp="1" noRot="1" noChangeAspect="1"/>
+          </p:cNvSpPr>
+          <p:nvPr>
+            <p:ph type="sldImg"/>
+          </p:nvPr>
+        </p:nvSpPr>
+        <p:spPr/>
+      </p:sp>
+      <p:sp>
+        <p:nvSpPr>
+          <p:cNvPr id="3" name="Marcador de notas 2"/>
+          <p:cNvSpPr>
+            <a:spLocks noGrp="1"/>
+          </p:cNvSpPr>
+          <p:nvPr>
+            <p:ph type="body" idx="1"/>
+          </p:nvPr>
+        </p:nvSpPr>
+        <p:spPr/>
+        <p:txBody>
+          <a:bodyPr/>
+          <a:lstStyle/>
+          <a:p>
+            <a:r>
+              <a:rPr lang="es-ES" dirty="0"/>
+              <a:t>Una vez recogidos los datos y analizados, se da paso a la construcción del modelo.  Para esta parte estuvo leyendo algunos artículos y también apoyándome en compañeros de trabajo que estaban investigando en el mismo campo para sacar algunas conclusiones sobre mis datos y sobre algún método de clasificación.</a:t>
+            </a:r>
+          </a:p>
+          <a:p>
+            <a:endParaRPr lang="es-ES" dirty="0"/>
+          </a:p>
+          <a:p>
+            <a:r>
+              <a:rPr lang="es-ES" dirty="0"/>
+              <a:t>Lo que había leído sobre clasificación de tráfico, se llevaba a cabo mediante clasificación de </a:t>
+            </a:r>
+            <a:r>
+              <a:rPr lang="es-ES" dirty="0" err="1"/>
+              <a:t>flows</a:t>
+            </a:r>
+            <a:r>
+              <a:rPr lang="es-ES" dirty="0"/>
+              <a:t> (conjuntos de paquetes que se encuentran en una misma </a:t>
+            </a:r>
+            <a:r>
+              <a:rPr lang="es-ES" dirty="0" err="1"/>
+              <a:t>omunicación</a:t>
+            </a:r>
+            <a:r>
+              <a:rPr lang="es-ES" dirty="0"/>
+              <a:t> entre el origen y el destino. Dentro de una conexión, puede haber diferentes </a:t>
+            </a:r>
+            <a:r>
+              <a:rPr lang="es-ES" dirty="0" err="1"/>
+              <a:t>flows</a:t>
+            </a:r>
+            <a:r>
+              <a:rPr lang="es-ES" dirty="0"/>
+              <a:t>)</a:t>
+            </a:r>
+          </a:p>
+          <a:p>
+            <a:endParaRPr lang="es-ES" dirty="0"/>
+          </a:p>
+          <a:p>
+            <a:r>
+              <a:rPr lang="es-ES" dirty="0"/>
+              <a:t>Sin embargo, observando los datos y si nos fijamos en la media de paquete, se puede observar que es bastante diferente, por lo que decidí emplear el tamaño de paquete, además del protocolo al que pertenece cada paquete, como variables para clasificar.</a:t>
+            </a:r>
+          </a:p>
+          <a:p>
+            <a:endParaRPr lang="es-ES" dirty="0"/>
+          </a:p>
+          <a:p>
+            <a:r>
+              <a:rPr lang="es-ES" dirty="0"/>
+              <a:t>El resto no las uso porque va a depender  mucho de dónde se ejecute, como </a:t>
+            </a:r>
+            <a:r>
+              <a:rPr lang="es-ES" dirty="0" err="1"/>
+              <a:t>Ips</a:t>
+            </a:r>
+            <a:r>
+              <a:rPr lang="es-ES" dirty="0"/>
+              <a:t> o puertos.</a:t>
+            </a:r>
+          </a:p>
+        </p:txBody>
+      </p:sp>
+      <p:sp>
+        <p:nvSpPr>
+          <p:cNvPr id="4" name="Marcador de número de diapositiva 3"/>
+          <p:cNvSpPr>
+            <a:spLocks noGrp="1"/>
+          </p:cNvSpPr>
+          <p:nvPr>
+            <p:ph type="sldNum" sz="quarter" idx="10"/>
+          </p:nvPr>
+        </p:nvSpPr>
+        <p:spPr/>
+        <p:txBody>
+          <a:bodyPr/>
+          <a:lstStyle/>
+          <a:p>
+            <a:fld id="{0A39E505-5E6B-4B15-B11C-28AB1E673129}" type="slidenum">
+              <a:rPr lang="es-ES" smtClean="0"/>
+              <a:t>5</a:t>
+            </a:fld>
+            <a:endParaRPr lang="es-ES"/>
+          </a:p>
+        </p:txBody>
+      </p:sp>
+    </p:spTree>
+    <p:extLst>
+      <p:ext uri="{BB962C8B-B14F-4D97-AF65-F5344CB8AC3E}">
+        <p14:creationId xmlns:p14="http://schemas.microsoft.com/office/powerpoint/2010/main" val="1353634702"/>
+      </p:ext>
+    </p:extLst>
+  </p:cSld>
+  <p:clrMapOvr>
+    <a:masterClrMapping/>
+  </p:clrMapOvr>
+</p:notes>
+</file>
+
+<file path=ppt/notesSlides/notesSlide6.xml><?xml version="1.0" encoding="utf-8"?>
+<p:notes xmlns:a="http://schemas.openxmlformats.org/drawingml/2006/main" xmlns:r="http://schemas.openxmlformats.org/officeDocument/2006/relationships" xmlns:p="http://schemas.openxmlformats.org/presentationml/2006/main">
+  <p:cSld>
+    <p:spTree>
+      <p:nvGrpSpPr>
+        <p:cNvPr id="1" name=""/>
+        <p:cNvGrpSpPr/>
+        <p:nvPr/>
+      </p:nvGrpSpPr>
+      <p:grpSpPr>
+        <a:xfrm>
+          <a:off x="0" y="0"/>
+          <a:ext cx="0" cy="0"/>
+          <a:chOff x="0" y="0"/>
+          <a:chExt cx="0" cy="0"/>
+        </a:xfrm>
+      </p:grpSpPr>
+      <p:sp>
+        <p:nvSpPr>
+          <p:cNvPr id="2" name="Marcador de imagen de diapositiva 1"/>
+          <p:cNvSpPr>
+            <a:spLocks noGrp="1" noRot="1" noChangeAspect="1"/>
+          </p:cNvSpPr>
+          <p:nvPr>
+            <p:ph type="sldImg"/>
+          </p:nvPr>
+        </p:nvSpPr>
+        <p:spPr/>
+      </p:sp>
+      <p:sp>
+        <p:nvSpPr>
+          <p:cNvPr id="3" name="Marcador de notas 2"/>
+          <p:cNvSpPr>
+            <a:spLocks noGrp="1"/>
+          </p:cNvSpPr>
+          <p:nvPr>
+            <p:ph type="body" idx="1"/>
+          </p:nvPr>
+        </p:nvSpPr>
+        <p:spPr/>
+        <p:txBody>
+          <a:bodyPr/>
+          <a:lstStyle/>
+          <a:p>
+            <a:r>
+              <a:rPr lang="es-ES" dirty="0"/>
+              <a:t>Estos son los modelos.</a:t>
+            </a:r>
+          </a:p>
+          <a:p>
+            <a:endParaRPr lang="es-ES" dirty="0"/>
+          </a:p>
+          <a:p>
+            <a:r>
+              <a:rPr lang="es-ES" dirty="0"/>
+              <a:t>El primero, solo estaba disponible para hacer clasificación binaria, por lo que para nuestro caso me di cuenta después que no nos valía.</a:t>
+            </a:r>
+          </a:p>
+          <a:p>
+            <a:endParaRPr lang="es-ES" dirty="0"/>
+          </a:p>
+          <a:p>
+            <a:r>
+              <a:rPr lang="es-ES" dirty="0"/>
+              <a:t>Dos redes neuronales</a:t>
+            </a:r>
+          </a:p>
+          <a:p>
+            <a:endParaRPr lang="es-ES" dirty="0"/>
+          </a:p>
+          <a:p>
+            <a:r>
+              <a:rPr lang="es-ES" dirty="0" err="1"/>
+              <a:t>Random</a:t>
+            </a:r>
+            <a:r>
+              <a:rPr lang="es-ES" dirty="0"/>
+              <a:t> Forest con la librería ML (</a:t>
+            </a:r>
+            <a:r>
+              <a:rPr lang="es-ES" dirty="0" err="1"/>
+              <a:t>batch</a:t>
+            </a:r>
+            <a:r>
+              <a:rPr lang="es-ES" dirty="0"/>
+              <a:t>)</a:t>
+            </a:r>
+          </a:p>
+          <a:p>
+            <a:endParaRPr lang="es-ES" dirty="0"/>
+          </a:p>
+          <a:p>
+            <a:r>
+              <a:rPr lang="es-ES" dirty="0" err="1"/>
+              <a:t>Randome</a:t>
+            </a:r>
+            <a:r>
+              <a:rPr lang="es-ES" dirty="0"/>
+              <a:t> Forest con la librería </a:t>
+            </a:r>
+            <a:r>
+              <a:rPr lang="es-ES" dirty="0" err="1"/>
+              <a:t>mllib</a:t>
+            </a:r>
+            <a:r>
+              <a:rPr lang="es-ES" dirty="0"/>
+              <a:t> (</a:t>
+            </a:r>
+            <a:r>
+              <a:rPr lang="es-ES" dirty="0" err="1"/>
+              <a:t>streaming</a:t>
+            </a:r>
+            <a:r>
+              <a:rPr lang="es-ES" dirty="0"/>
+              <a:t>)</a:t>
+            </a:r>
+          </a:p>
+          <a:p>
+            <a:endParaRPr lang="es-ES" dirty="0"/>
+          </a:p>
+          <a:p>
+            <a:endParaRPr lang="es-ES" dirty="0"/>
+          </a:p>
+        </p:txBody>
+      </p:sp>
+      <p:sp>
+        <p:nvSpPr>
+          <p:cNvPr id="4" name="Marcador de número de diapositiva 3"/>
+          <p:cNvSpPr>
+            <a:spLocks noGrp="1"/>
+          </p:cNvSpPr>
+          <p:nvPr>
+            <p:ph type="sldNum" sz="quarter" idx="10"/>
+          </p:nvPr>
+        </p:nvSpPr>
+        <p:spPr/>
+        <p:txBody>
+          <a:bodyPr/>
+          <a:lstStyle/>
+          <a:p>
+            <a:fld id="{0A39E505-5E6B-4B15-B11C-28AB1E673129}" type="slidenum">
+              <a:rPr lang="es-ES" smtClean="0"/>
+              <a:t>6</a:t>
+            </a:fld>
+            <a:endParaRPr lang="es-ES"/>
+          </a:p>
+        </p:txBody>
+      </p:sp>
+    </p:spTree>
+    <p:extLst>
+      <p:ext uri="{BB962C8B-B14F-4D97-AF65-F5344CB8AC3E}">
+        <p14:creationId xmlns:p14="http://schemas.microsoft.com/office/powerpoint/2010/main" val="3807412482"/>
+      </p:ext>
+    </p:extLst>
+  </p:cSld>
+  <p:clrMapOvr>
+    <a:masterClrMapping/>
+  </p:clrMapOvr>
+</p:notes>
+</file>
+
+<file path=ppt/notesSlides/notesSlide7.xml><?xml version="1.0" encoding="utf-8"?>
+<p:notes xmlns:a="http://schemas.openxmlformats.org/drawingml/2006/main" xmlns:r="http://schemas.openxmlformats.org/officeDocument/2006/relationships" xmlns:p="http://schemas.openxmlformats.org/presentationml/2006/main">
+  <p:cSld>
+    <p:spTree>
+      <p:nvGrpSpPr>
+        <p:cNvPr id="1" name=""/>
+        <p:cNvGrpSpPr/>
+        <p:nvPr/>
+      </p:nvGrpSpPr>
+      <p:grpSpPr>
+        <a:xfrm>
+          <a:off x="0" y="0"/>
+          <a:ext cx="0" cy="0"/>
+          <a:chOff x="0" y="0"/>
+          <a:chExt cx="0" cy="0"/>
+        </a:xfrm>
+      </p:grpSpPr>
+      <p:sp>
+        <p:nvSpPr>
+          <p:cNvPr id="2" name="Marcador de imagen de diapositiva 1"/>
+          <p:cNvSpPr>
+            <a:spLocks noGrp="1" noRot="1" noChangeAspect="1"/>
+          </p:cNvSpPr>
+          <p:nvPr>
+            <p:ph type="sldImg"/>
+          </p:nvPr>
+        </p:nvSpPr>
+        <p:spPr/>
+      </p:sp>
+      <p:sp>
+        <p:nvSpPr>
+          <p:cNvPr id="3" name="Marcador de notas 2"/>
+          <p:cNvSpPr>
+            <a:spLocks noGrp="1"/>
+          </p:cNvSpPr>
+          <p:nvPr>
+            <p:ph type="body" idx="1"/>
+          </p:nvPr>
+        </p:nvSpPr>
+        <p:spPr/>
+        <p:txBody>
+          <a:bodyPr/>
+          <a:lstStyle/>
+          <a:p>
             <a:endParaRPr lang="es-ES"/>
           </a:p>
         </p:txBody>
@@ -17218,7 +18162,7 @@
         </p:xfrm>
         <a:graphic>
           <a:graphicData uri="http://schemas.openxmlformats.org/drawingml/2006/diagram">
-            <dgm:relIds xmlns:dgm="http://schemas.openxmlformats.org/drawingml/2006/diagram" xmlns:r="http://schemas.openxmlformats.org/officeDocument/2006/relationships" r:dm="rId2" r:lo="rId3" r:qs="rId4" r:cs="rId5"/>
+            <dgm:relIds xmlns:dgm="http://schemas.openxmlformats.org/drawingml/2006/diagram" xmlns:r="http://schemas.openxmlformats.org/officeDocument/2006/relationships" r:dm="rId3" r:lo="rId4" r:qs="rId5" r:cs="rId6"/>
           </a:graphicData>
         </a:graphic>
       </p:graphicFrame>
@@ -17441,7 +18385,7 @@
           <p:nvPr/>
         </p:nvPicPr>
         <p:blipFill>
-          <a:blip r:embed="rId2">
+          <a:blip r:embed="rId3">
             <a:extLst>
               <a:ext uri="{28A0092B-C50C-407E-A947-70E740481C1C}">
                 <a14:useLocalDpi xmlns:a14="http://schemas.microsoft.com/office/drawing/2010/main" val="0"/>
@@ -17477,7 +18421,7 @@
           <p:nvPr/>
         </p:nvPicPr>
         <p:blipFill rotWithShape="1">
-          <a:blip r:embed="rId3">
+          <a:blip r:embed="rId4">
             <a:extLst>
               <a:ext uri="{28A0092B-C50C-407E-A947-70E740481C1C}">
                 <a14:useLocalDpi xmlns:a14="http://schemas.microsoft.com/office/drawing/2010/main" val="0"/>
@@ -17512,7 +18456,7 @@
           <p:nvPr/>
         </p:nvPicPr>
         <p:blipFill>
-          <a:blip r:embed="rId4">
+          <a:blip r:embed="rId5">
             <a:extLst>
               <a:ext uri="{28A0092B-C50C-407E-A947-70E740481C1C}">
                 <a14:useLocalDpi xmlns:a14="http://schemas.microsoft.com/office/drawing/2010/main" val="0"/>
@@ -18704,7 +19648,7 @@
           <p:nvPr/>
         </p:nvPicPr>
         <p:blipFill>
-          <a:blip r:embed="rId2"/>
+          <a:blip r:embed="rId3"/>
           <a:stretch>
             <a:fillRect/>
           </a:stretch>
@@ -18920,7 +19864,7 @@
           <p:nvPr/>
         </p:nvPicPr>
         <p:blipFill>
-          <a:blip r:embed="rId2"/>
+          <a:blip r:embed="rId3"/>
           <a:stretch>
             <a:fillRect/>
           </a:stretch>

</xml_diff>